<commit_message>
made code more tidyverse friendly.
</commit_message>
<xml_diff>
--- a/Workshops/Workshop4.pptx
+++ b/Workshops/Workshop4.pptx
@@ -5,7 +5,7 @@
     <p:sldMasterId id="2147483648" r:id="rId1"/>
   </p:sldMasterIdLst>
   <p:notesMasterIdLst>
-    <p:NotesMasterId r:id="rId39"/>
+    <p:NotesMasterId r:id="rId37"/>
   </p:notesMasterIdLst>
   <p:sldIdLst>
     <p:sldId id="256" r:id="rId2"/>
@@ -43,8 +43,6 @@
     <p:sldId id="288" r:id="rId34"/>
     <p:sldId id="289" r:id="rId35"/>
     <p:sldId id="290" r:id="rId36"/>
-    <p:sldId id="291" r:id="rId37"/>
-    <p:sldId id="292" r:id="rId38"/>
   </p:sldIdLst>
   <p:sldSz cx="12192000" cy="6858000"/>
   <p:notesSz cx="6858000" cy="9144000"/>
@@ -1536,7 +1534,7 @@
           <a:p>
             <a:fld id="{18BDFEC3-8487-43E8-A154-7C12CBC1FFF2}" type="slidenum">
               <a:rPr lang="en-US"/>
-              <a:t>30</a:t>
+              <a:t>28</a:t>
             </a:fld>
             <a:endParaRPr lang="en-US"/>
           </a:p>
@@ -1650,7 +1648,7 @@
           <a:p>
             <a:fld id="{18BDFEC3-8487-43E8-A154-7C12CBC1FFF2}" type="slidenum">
               <a:rPr lang="en-US"/>
-              <a:t>33</a:t>
+              <a:t>31</a:t>
             </a:fld>
             <a:endParaRPr lang="en-US"/>
           </a:p>
@@ -7794,7 +7792,22 @@
               <a:rPr sz="1800">
                 <a:latin typeface="Courier"/>
               </a:rPr>
-              <a:t>cchic</a:t>
+              <a:t>cchic &lt;-</a:t>
+            </a:r>
+            <a:r>
+              <a:rPr sz="1800">
+                <a:solidFill>
+                  <a:srgbClr val="4070A0"/>
+                </a:solidFill>
+                <a:latin typeface="Courier"/>
+              </a:rPr>
+              <a:t> </a:t>
+            </a:r>
+            <a:r>
+              <a:rPr sz="1800">
+                <a:latin typeface="Courier"/>
+              </a:rPr>
+              <a:t>cchic </a:t>
             </a:r>
             <a:r>
               <a:rPr sz="1800">
@@ -7803,13 +7816,16 @@
                 </a:solidFill>
                 <a:latin typeface="Courier"/>
               </a:rPr>
-              <a:t>$</a:t>
-            </a:r>
-            <a:r>
-              <a:rPr sz="1800">
-                <a:latin typeface="Courier"/>
-              </a:rPr>
-              <a:t>temp_nc &lt;-</a:t>
+              <a:t>%&gt;%</a:t>
+            </a:r>
+            <a:r>
+              <a:rPr sz="1800">
+                <a:solidFill>
+                  <a:srgbClr val="4070A0"/>
+                </a:solidFill>
+                <a:latin typeface="Courier"/>
+              </a:rPr>
+              <a:t> </a:t>
             </a:r>
             <a:br/>
             <a:r>
@@ -7828,28 +7844,43 @@
                 </a:solidFill>
                 <a:latin typeface="Courier"/>
               </a:rPr>
+              <a:t>mutate</a:t>
+            </a:r>
+            <a:r>
+              <a:rPr sz="1800">
+                <a:latin typeface="Courier"/>
+              </a:rPr>
+              <a:t>(</a:t>
+            </a:r>
+            <a:r>
+              <a:rPr sz="1800">
+                <a:solidFill>
+                  <a:srgbClr val="902000"/>
+                </a:solidFill>
+                <a:latin typeface="Courier"/>
+              </a:rPr>
+              <a:t>temp_nc =</a:t>
+            </a:r>
+            <a:r>
+              <a:rPr sz="1800">
+                <a:latin typeface="Courier"/>
+              </a:rPr>
+              <a:t> </a:t>
+            </a:r>
+            <a:r>
+              <a:rPr sz="1800" b="1">
+                <a:solidFill>
+                  <a:srgbClr val="007020"/>
+                </a:solidFill>
+                <a:latin typeface="Courier"/>
+              </a:rPr>
               <a:t>parse_number</a:t>
             </a:r>
             <a:r>
               <a:rPr sz="1800">
                 <a:latin typeface="Courier"/>
               </a:rPr>
-              <a:t>(cchic</a:t>
-            </a:r>
-            <a:r>
-              <a:rPr sz="1800">
-                <a:solidFill>
-                  <a:srgbClr val="666666"/>
-                </a:solidFill>
-                <a:latin typeface="Courier"/>
-              </a:rPr>
-              <a:t>$</a:t>
-            </a:r>
-            <a:r>
-              <a:rPr sz="1800">
-                <a:latin typeface="Courier"/>
-              </a:rPr>
-              <a:t>temp_nc)</a:t>
+              <a:t>(temp_nc))</a:t>
             </a:r>
           </a:p>
         </p:txBody>
@@ -8520,7 +8551,7 @@
               <a:rPr sz="1800">
                 <a:latin typeface="Courier"/>
               </a:rPr>
-              <a:t>cchic_year_born &lt;-</a:t>
+              <a:t>cchic &lt;-</a:t>
             </a:r>
             <a:r>
               <a:rPr sz="1800">
@@ -8532,12 +8563,76 @@
               <a:t> </a:t>
             </a:r>
             <a:r>
+              <a:rPr sz="1800">
+                <a:latin typeface="Courier"/>
+              </a:rPr>
+              <a:t>cchic </a:t>
+            </a:r>
+            <a:r>
+              <a:rPr sz="1800">
+                <a:solidFill>
+                  <a:srgbClr val="666666"/>
+                </a:solidFill>
+                <a:latin typeface="Courier"/>
+              </a:rPr>
+              <a:t>%&gt;%</a:t>
+            </a:r>
+            <a:r>
+              <a:rPr sz="1800">
+                <a:solidFill>
+                  <a:srgbClr val="4070A0"/>
+                </a:solidFill>
+                <a:latin typeface="Courier"/>
+              </a:rPr>
+              <a:t> </a:t>
+            </a:r>
+            <a:br/>
+            <a:r>
+              <a:rPr sz="1800">
+                <a:solidFill>
+                  <a:srgbClr val="4070A0"/>
+                </a:solidFill>
+                <a:latin typeface="Courier"/>
+              </a:rPr>
+              <a:t>  </a:t>
+            </a:r>
+            <a:r>
               <a:rPr sz="1800" b="1">
                 <a:solidFill>
                   <a:srgbClr val="007020"/>
                 </a:solidFill>
                 <a:latin typeface="Courier"/>
               </a:rPr>
+              <a:t>mutate</a:t>
+            </a:r>
+            <a:r>
+              <a:rPr sz="1800">
+                <a:latin typeface="Courier"/>
+              </a:rPr>
+              <a:t>(</a:t>
+            </a:r>
+            <a:r>
+              <a:rPr sz="1800">
+                <a:solidFill>
+                  <a:srgbClr val="902000"/>
+                </a:solidFill>
+                <a:latin typeface="Courier"/>
+              </a:rPr>
+              <a:t>year_born =</a:t>
+            </a:r>
+            <a:r>
+              <a:rPr sz="1800">
+                <a:latin typeface="Courier"/>
+              </a:rPr>
+              <a:t> </a:t>
+            </a:r>
+            <a:r>
+              <a:rPr sz="1800" b="1">
+                <a:solidFill>
+                  <a:srgbClr val="007020"/>
+                </a:solidFill>
+                <a:latin typeface="Courier"/>
+              </a:rPr>
               <a:t>year</a:t>
             </a:r>
             <a:r>
@@ -8559,6 +8654,23 @@
               <a:rPr sz="1800">
                 <a:latin typeface="Courier"/>
               </a:rPr>
+              <a:t>(dob)))</a:t>
+            </a:r>
+            <a:br/>
+            <a:br/>
+            <a:r>
+              <a:rPr sz="1800" b="1">
+                <a:solidFill>
+                  <a:srgbClr val="007020"/>
+                </a:solidFill>
+                <a:latin typeface="Courier"/>
+              </a:rPr>
+              <a:t>str</a:t>
+            </a:r>
+            <a:r>
+              <a:rPr sz="1800">
+                <a:latin typeface="Courier"/>
+              </a:rPr>
               <a:t>(cchic</a:t>
             </a:r>
             <a:r>
@@ -8574,7 +8686,7 @@
               <a:rPr sz="1800">
                 <a:latin typeface="Courier"/>
               </a:rPr>
-              <a:t>dob))</a:t>
+              <a:t>year_born)</a:t>
             </a:r>
           </a:p>
           <a:p>
@@ -8594,7 +8706,40 @@
               <a:rPr sz="1800">
                 <a:latin typeface="Courier"/>
               </a:rPr>
-              <a:t>discharge_days &lt;-</a:t>
+              <a:t>cchic &lt;-</a:t>
+            </a:r>
+            <a:r>
+              <a:rPr sz="1800">
+                <a:solidFill>
+                  <a:srgbClr val="4070A0"/>
+                </a:solidFill>
+                <a:latin typeface="Courier"/>
+              </a:rPr>
+              <a:t> </a:t>
+            </a:r>
+            <a:r>
+              <a:rPr sz="1800">
+                <a:latin typeface="Courier"/>
+              </a:rPr>
+              <a:t>cchic </a:t>
+            </a:r>
+            <a:r>
+              <a:rPr sz="1800">
+                <a:solidFill>
+                  <a:srgbClr val="666666"/>
+                </a:solidFill>
+                <a:latin typeface="Courier"/>
+              </a:rPr>
+              <a:t>%&gt;%</a:t>
+            </a:r>
+            <a:r>
+              <a:rPr sz="1800">
+                <a:solidFill>
+                  <a:srgbClr val="4070A0"/>
+                </a:solidFill>
+                <a:latin typeface="Courier"/>
+              </a:rPr>
+              <a:t> </a:t>
             </a:r>
             <a:br/>
             <a:r>
@@ -8613,6 +8758,36 @@
                 </a:solidFill>
                 <a:latin typeface="Courier"/>
               </a:rPr>
+              <a:t>mutate</a:t>
+            </a:r>
+            <a:r>
+              <a:rPr sz="1800">
+                <a:latin typeface="Courier"/>
+              </a:rPr>
+              <a:t>(</a:t>
+            </a:r>
+            <a:r>
+              <a:rPr sz="1800">
+                <a:solidFill>
+                  <a:srgbClr val="902000"/>
+                </a:solidFill>
+                <a:latin typeface="Courier"/>
+              </a:rPr>
+              <a:t>discharge_day =</a:t>
+            </a:r>
+            <a:r>
+              <a:rPr sz="1800">
+                <a:latin typeface="Courier"/>
+              </a:rPr>
+              <a:t> </a:t>
+            </a:r>
+            <a:r>
+              <a:rPr sz="1800" b="1">
+                <a:solidFill>
+                  <a:srgbClr val="007020"/>
+                </a:solidFill>
+                <a:latin typeface="Courier"/>
+              </a:rPr>
               <a:t>day</a:t>
             </a:r>
             <a:r>
@@ -8649,7 +8824,39 @@
               <a:rPr sz="1800">
                 <a:latin typeface="Courier"/>
               </a:rPr>
-              <a:t>discharge))</a:t>
+              <a:t>discharge)))</a:t>
+            </a:r>
+            <a:br/>
+            <a:br/>
+            <a:r>
+              <a:rPr sz="1800" b="1">
+                <a:solidFill>
+                  <a:srgbClr val="007020"/>
+                </a:solidFill>
+                <a:latin typeface="Courier"/>
+              </a:rPr>
+              <a:t>str</a:t>
+            </a:r>
+            <a:r>
+              <a:rPr sz="1800">
+                <a:latin typeface="Courier"/>
+              </a:rPr>
+              <a:t>(cchic</a:t>
+            </a:r>
+            <a:r>
+              <a:rPr sz="1800">
+                <a:solidFill>
+                  <a:srgbClr val="666666"/>
+                </a:solidFill>
+                <a:latin typeface="Courier"/>
+              </a:rPr>
+              <a:t>$</a:t>
+            </a:r>
+            <a:r>
+              <a:rPr sz="1800">
+                <a:latin typeface="Courier"/>
+              </a:rPr>
+              <a:t>discharge_day)</a:t>
             </a:r>
           </a:p>
         </p:txBody>
@@ -8741,25 +8948,131 @@
             </a:pPr>
             <a:r>
               <a:rPr/>
-              <a:t>Calculating time differences between dates.</a:t>
-            </a:r>
-          </a:p>
-          <a:p>
-            <a:pPr lvl="1">
-              <a:buAutoNum type="arabicPeriod"/>
+              <a:t>We often want to calculate the difference between two dates or times. Let’s calculate the length of stay of patients admitted to the ICU.</a:t>
+            </a:r>
+          </a:p>
+          <a:p>
+            <a:pPr lvl="0" marL="1270000" indent="0">
+              <a:buNone/>
             </a:pPr>
             <a:r>
-              <a:rPr/>
-              <a:t>Initially convert both variables to date format, then calculate difference (R normally imports dates as characters)</a:t>
-            </a:r>
-          </a:p>
-          <a:p>
-            <a:pPr lvl="1">
-              <a:buAutoNum type="arabicPeriod"/>
-            </a:pPr>
-            <a:r>
-              <a:rPr/>
-              <a:t>Calculate difference in one go, ensuring that R knows the two variables are dates</a:t>
+              <a:rPr sz="1800">
+                <a:latin typeface="Courier"/>
+              </a:rPr>
+              <a:t>cchic &lt;-</a:t>
+            </a:r>
+            <a:r>
+              <a:rPr sz="1800">
+                <a:solidFill>
+                  <a:srgbClr val="4070A0"/>
+                </a:solidFill>
+                <a:latin typeface="Courier"/>
+              </a:rPr>
+              <a:t> </a:t>
+            </a:r>
+            <a:r>
+              <a:rPr sz="1800">
+                <a:latin typeface="Courier"/>
+              </a:rPr>
+              <a:t>cchic </a:t>
+            </a:r>
+            <a:r>
+              <a:rPr sz="1800">
+                <a:solidFill>
+                  <a:srgbClr val="666666"/>
+                </a:solidFill>
+                <a:latin typeface="Courier"/>
+              </a:rPr>
+              <a:t>%&gt;%</a:t>
+            </a:r>
+            <a:br/>
+            <a:r>
+              <a:rPr sz="1800">
+                <a:solidFill>
+                  <a:srgbClr val="4070A0"/>
+                </a:solidFill>
+                <a:latin typeface="Courier"/>
+              </a:rPr>
+              <a:t>  </a:t>
+            </a:r>
+            <a:r>
+              <a:rPr sz="1800" b="1">
+                <a:solidFill>
+                  <a:srgbClr val="007020"/>
+                </a:solidFill>
+                <a:latin typeface="Courier"/>
+              </a:rPr>
+              <a:t>mutate</a:t>
+            </a:r>
+            <a:r>
+              <a:rPr sz="1800">
+                <a:latin typeface="Courier"/>
+              </a:rPr>
+              <a:t>(</a:t>
+            </a:r>
+            <a:r>
+              <a:rPr sz="1800">
+                <a:solidFill>
+                  <a:srgbClr val="902000"/>
+                </a:solidFill>
+                <a:latin typeface="Courier"/>
+              </a:rPr>
+              <a:t>los =</a:t>
+            </a:r>
+            <a:r>
+              <a:rPr sz="1800">
+                <a:latin typeface="Courier"/>
+              </a:rPr>
+              <a:t> (</a:t>
+            </a:r>
+            <a:r>
+              <a:rPr sz="1800" b="1">
+                <a:solidFill>
+                  <a:srgbClr val="007020"/>
+                </a:solidFill>
+                <a:latin typeface="Courier"/>
+              </a:rPr>
+              <a:t>dmy</a:t>
+            </a:r>
+            <a:r>
+              <a:rPr sz="1800">
+                <a:latin typeface="Courier"/>
+              </a:rPr>
+              <a:t>(discharge) </a:t>
+            </a:r>
+            <a:r>
+              <a:rPr sz="1800">
+                <a:solidFill>
+                  <a:srgbClr val="666666"/>
+                </a:solidFill>
+                <a:latin typeface="Courier"/>
+              </a:rPr>
+              <a:t>-</a:t>
+            </a:r>
+            <a:br/>
+            <a:r>
+              <a:rPr sz="1800">
+                <a:solidFill>
+                  <a:srgbClr val="4070A0"/>
+                </a:solidFill>
+                <a:latin typeface="Courier"/>
+              </a:rPr>
+              <a:t>    </a:t>
+            </a:r>
+            <a:r>
+              <a:rPr sz="1800" b="1">
+                <a:solidFill>
+                  <a:srgbClr val="007020"/>
+                </a:solidFill>
+                <a:latin typeface="Courier"/>
+              </a:rPr>
+              <a:t>dmy</a:t>
+            </a:r>
+            <a:r>
+              <a:rPr sz="1800">
+                <a:latin typeface="Courier"/>
+              </a:rPr>
+              <a:t>(admission)))</a:t>
             </a:r>
           </a:p>
         </p:txBody>
@@ -8770,566 +9083,6 @@
 </file>
 
 <file path=ppt/slides/slide28.xml><?xml version="1.0" encoding="utf-8"?>
-<p:sld xmlns:a="http://schemas.openxmlformats.org/drawingml/2006/main" xmlns:r="http://schemas.openxmlformats.org/officeDocument/2006/relationships" xmlns:p="http://schemas.openxmlformats.org/presentationml/2006/main">
-  <p:cSld>
-    <p:spTree>
-      <p:nvGrpSpPr>
-        <p:cNvPr id="1" name=""/>
-        <p:cNvGrpSpPr/>
-        <p:nvPr/>
-      </p:nvGrpSpPr>
-      <p:grpSpPr>
-        <a:xfrm>
-          <a:off x="0" y="0"/>
-          <a:ext cx="0" cy="0"/>
-          <a:chOff x="0" y="0"/>
-          <a:chExt cx="0" cy="0"/>
-        </a:xfrm>
-      </p:grpSpPr>
-      <p:sp>
-        <p:nvSpPr>
-          <p:cNvPr id="3" name="Content Placeholder 2">
-            <a:extLst>
-              <a:ext uri="{FF2B5EF4-FFF2-40B4-BE49-F238E27FC236}">
-                <a16:creationId xmlns:a16="http://schemas.microsoft.com/office/drawing/2014/main" id="{D10DDA37-E46B-B641-BC9F-636CB92A2C08}"/>
-              </a:ext>
-            </a:extLst>
-          </p:cNvPr>
-          <p:cNvSpPr>
-            <a:spLocks noGrp="1"/>
-          </p:cNvSpPr>
-          <p:nvPr>
-            <p:ph idx="1"/>
-          </p:nvPr>
-        </p:nvSpPr>
-        <p:spPr/>
-        <p:txBody>
-          <a:bodyPr/>
-          <a:lstStyle/>
-          <a:p>
-            <a:pPr lvl="0" marL="0" indent="0">
-              <a:buNone/>
-            </a:pPr>
-            <a:r>
-              <a:rPr/>
-              <a:t>Convert both variables to date format, then calculate difference</a:t>
-            </a:r>
-          </a:p>
-          <a:p>
-            <a:pPr lvl="0" marL="1270000" indent="0">
-              <a:buNone/>
-            </a:pPr>
-            <a:r>
-              <a:rPr sz="1800">
-                <a:latin typeface="Courier"/>
-              </a:rPr>
-              <a:t>cchic</a:t>
-            </a:r>
-            <a:r>
-              <a:rPr sz="1800">
-                <a:solidFill>
-                  <a:srgbClr val="666666"/>
-                </a:solidFill>
-                <a:latin typeface="Courier"/>
-              </a:rPr>
-              <a:t>$</a:t>
-            </a:r>
-            <a:r>
-              <a:rPr sz="1800">
-                <a:latin typeface="Courier"/>
-              </a:rPr>
-              <a:t>discharge &lt;-</a:t>
-            </a:r>
-            <a:r>
-              <a:rPr sz="1800">
-                <a:solidFill>
-                  <a:srgbClr val="4070A0"/>
-                </a:solidFill>
-                <a:latin typeface="Courier"/>
-              </a:rPr>
-              <a:t> </a:t>
-            </a:r>
-            <a:r>
-              <a:rPr sz="1800" b="1">
-                <a:solidFill>
-                  <a:srgbClr val="007020"/>
-                </a:solidFill>
-                <a:latin typeface="Courier"/>
-              </a:rPr>
-              <a:t>dmy</a:t>
-            </a:r>
-            <a:r>
-              <a:rPr sz="1800">
-                <a:latin typeface="Courier"/>
-              </a:rPr>
-              <a:t>(cchic</a:t>
-            </a:r>
-            <a:r>
-              <a:rPr sz="1800">
-                <a:solidFill>
-                  <a:srgbClr val="666666"/>
-                </a:solidFill>
-                <a:latin typeface="Courier"/>
-              </a:rPr>
-              <a:t>$</a:t>
-            </a:r>
-            <a:r>
-              <a:rPr sz="1800">
-                <a:latin typeface="Courier"/>
-              </a:rPr>
-              <a:t>discharge)</a:t>
-            </a:r>
-            <a:br/>
-            <a:r>
-              <a:rPr sz="1800">
-                <a:latin typeface="Courier"/>
-              </a:rPr>
-              <a:t>cchic</a:t>
-            </a:r>
-            <a:r>
-              <a:rPr sz="1800">
-                <a:solidFill>
-                  <a:srgbClr val="666666"/>
-                </a:solidFill>
-                <a:latin typeface="Courier"/>
-              </a:rPr>
-              <a:t>$</a:t>
-            </a:r>
-            <a:r>
-              <a:rPr sz="1800">
-                <a:latin typeface="Courier"/>
-              </a:rPr>
-              <a:t>admission &lt;-</a:t>
-            </a:r>
-            <a:r>
-              <a:rPr sz="1800">
-                <a:solidFill>
-                  <a:srgbClr val="4070A0"/>
-                </a:solidFill>
-                <a:latin typeface="Courier"/>
-              </a:rPr>
-              <a:t> </a:t>
-            </a:r>
-            <a:r>
-              <a:rPr sz="1800" b="1">
-                <a:solidFill>
-                  <a:srgbClr val="007020"/>
-                </a:solidFill>
-                <a:latin typeface="Courier"/>
-              </a:rPr>
-              <a:t>dmy</a:t>
-            </a:r>
-            <a:r>
-              <a:rPr sz="1800">
-                <a:latin typeface="Courier"/>
-              </a:rPr>
-              <a:t>(cchic</a:t>
-            </a:r>
-            <a:r>
-              <a:rPr sz="1800">
-                <a:solidFill>
-                  <a:srgbClr val="666666"/>
-                </a:solidFill>
-                <a:latin typeface="Courier"/>
-              </a:rPr>
-              <a:t>$</a:t>
-            </a:r>
-            <a:r>
-              <a:rPr sz="1800">
-                <a:latin typeface="Courier"/>
-              </a:rPr>
-              <a:t>admission)</a:t>
-            </a:r>
-            <a:br/>
-            <a:br/>
-            <a:r>
-              <a:rPr sz="1800">
-                <a:latin typeface="Courier"/>
-              </a:rPr>
-              <a:t>cchic_los_test &lt;-</a:t>
-            </a:r>
-            <a:r>
-              <a:rPr sz="1800">
-                <a:solidFill>
-                  <a:srgbClr val="4070A0"/>
-                </a:solidFill>
-                <a:latin typeface="Courier"/>
-              </a:rPr>
-              <a:t> </a:t>
-            </a:r>
-            <a:r>
-              <a:rPr sz="1800">
-                <a:latin typeface="Courier"/>
-              </a:rPr>
-              <a:t>cchic</a:t>
-            </a:r>
-            <a:r>
-              <a:rPr sz="1800">
-                <a:solidFill>
-                  <a:srgbClr val="666666"/>
-                </a:solidFill>
-                <a:latin typeface="Courier"/>
-              </a:rPr>
-              <a:t>$</a:t>
-            </a:r>
-            <a:r>
-              <a:rPr sz="1800">
-                <a:latin typeface="Courier"/>
-              </a:rPr>
-              <a:t>discharge </a:t>
-            </a:r>
-            <a:r>
-              <a:rPr sz="1800">
-                <a:solidFill>
-                  <a:srgbClr val="666666"/>
-                </a:solidFill>
-                <a:latin typeface="Courier"/>
-              </a:rPr>
-              <a:t>-</a:t>
-            </a:r>
-            <a:r>
-              <a:rPr sz="1800">
-                <a:solidFill>
-                  <a:srgbClr val="4070A0"/>
-                </a:solidFill>
-                <a:latin typeface="Courier"/>
-              </a:rPr>
-              <a:t> </a:t>
-            </a:r>
-            <a:r>
-              <a:rPr sz="1800">
-                <a:latin typeface="Courier"/>
-              </a:rPr>
-              <a:t>cchic</a:t>
-            </a:r>
-            <a:r>
-              <a:rPr sz="1800">
-                <a:solidFill>
-                  <a:srgbClr val="666666"/>
-                </a:solidFill>
-                <a:latin typeface="Courier"/>
-              </a:rPr>
-              <a:t>$</a:t>
-            </a:r>
-            <a:r>
-              <a:rPr sz="1800">
-                <a:latin typeface="Courier"/>
-              </a:rPr>
-              <a:t>admission</a:t>
-            </a:r>
-          </a:p>
-        </p:txBody>
-      </p:sp>
-    </p:spTree>
-  </p:cSld>
-</p:sld>
-</file>
-
-<file path=ppt/slides/slide29.xml><?xml version="1.0" encoding="utf-8"?>
-<p:sld xmlns:a="http://schemas.openxmlformats.org/drawingml/2006/main" xmlns:r="http://schemas.openxmlformats.org/officeDocument/2006/relationships" xmlns:p="http://schemas.openxmlformats.org/presentationml/2006/main">
-  <p:cSld>
-    <p:spTree>
-      <p:nvGrpSpPr>
-        <p:cNvPr id="1" name=""/>
-        <p:cNvGrpSpPr/>
-        <p:nvPr/>
-      </p:nvGrpSpPr>
-      <p:grpSpPr>
-        <a:xfrm>
-          <a:off x="0" y="0"/>
-          <a:ext cx="0" cy="0"/>
-          <a:chOff x="0" y="0"/>
-          <a:chExt cx="0" cy="0"/>
-        </a:xfrm>
-      </p:grpSpPr>
-      <p:sp>
-        <p:nvSpPr>
-          <p:cNvPr id="3" name="Content Placeholder 2">
-            <a:extLst>
-              <a:ext uri="{FF2B5EF4-FFF2-40B4-BE49-F238E27FC236}">
-                <a16:creationId xmlns:a16="http://schemas.microsoft.com/office/drawing/2014/main" id="{D10DDA37-E46B-B641-BC9F-636CB92A2C08}"/>
-              </a:ext>
-            </a:extLst>
-          </p:cNvPr>
-          <p:cNvSpPr>
-            <a:spLocks noGrp="1"/>
-          </p:cNvSpPr>
-          <p:nvPr>
-            <p:ph idx="1"/>
-          </p:nvPr>
-        </p:nvSpPr>
-        <p:spPr/>
-        <p:txBody>
-          <a:bodyPr/>
-          <a:lstStyle/>
-          <a:p>
-            <a:pPr lvl="0" marL="0" indent="0">
-              <a:buNone/>
-            </a:pPr>
-            <a:r>
-              <a:rPr/>
-              <a:t>Or do it in one go. Calculate difference, ensuring that R knows the two variables are dates</a:t>
-            </a:r>
-          </a:p>
-          <a:p>
-            <a:pPr lvl="0" marL="1270000" indent="0">
-              <a:buNone/>
-            </a:pPr>
-            <a:r>
-              <a:rPr sz="1800">
-                <a:latin typeface="Courier"/>
-              </a:rPr>
-              <a:t>cchic &lt;-</a:t>
-            </a:r>
-            <a:r>
-              <a:rPr sz="1800">
-                <a:solidFill>
-                  <a:srgbClr val="4070A0"/>
-                </a:solidFill>
-                <a:latin typeface="Courier"/>
-              </a:rPr>
-              <a:t> </a:t>
-            </a:r>
-            <a:r>
-              <a:rPr sz="1800">
-                <a:latin typeface="Courier"/>
-              </a:rPr>
-              <a:t>cchic </a:t>
-            </a:r>
-            <a:r>
-              <a:rPr sz="1800">
-                <a:solidFill>
-                  <a:srgbClr val="666666"/>
-                </a:solidFill>
-                <a:latin typeface="Courier"/>
-              </a:rPr>
-              <a:t>%&gt;%</a:t>
-            </a:r>
-            <a:br/>
-            <a:r>
-              <a:rPr sz="1800">
-                <a:solidFill>
-                  <a:srgbClr val="4070A0"/>
-                </a:solidFill>
-                <a:latin typeface="Courier"/>
-              </a:rPr>
-              <a:t>  </a:t>
-            </a:r>
-            <a:r>
-              <a:rPr sz="1800" b="1">
-                <a:solidFill>
-                  <a:srgbClr val="007020"/>
-                </a:solidFill>
-                <a:latin typeface="Courier"/>
-              </a:rPr>
-              <a:t>mutate</a:t>
-            </a:r>
-            <a:r>
-              <a:rPr sz="1800">
-                <a:latin typeface="Courier"/>
-              </a:rPr>
-              <a:t>(</a:t>
-            </a:r>
-            <a:r>
-              <a:rPr sz="1800">
-                <a:solidFill>
-                  <a:srgbClr val="902000"/>
-                </a:solidFill>
-                <a:latin typeface="Courier"/>
-              </a:rPr>
-              <a:t>los =</a:t>
-            </a:r>
-            <a:r>
-              <a:rPr sz="1800">
-                <a:latin typeface="Courier"/>
-              </a:rPr>
-              <a:t> (</a:t>
-            </a:r>
-            <a:r>
-              <a:rPr sz="1800" b="1">
-                <a:solidFill>
-                  <a:srgbClr val="007020"/>
-                </a:solidFill>
-                <a:latin typeface="Courier"/>
-              </a:rPr>
-              <a:t>dmy</a:t>
-            </a:r>
-            <a:r>
-              <a:rPr sz="1800">
-                <a:latin typeface="Courier"/>
-              </a:rPr>
-              <a:t>(discharge) </a:t>
-            </a:r>
-            <a:r>
-              <a:rPr sz="1800">
-                <a:solidFill>
-                  <a:srgbClr val="666666"/>
-                </a:solidFill>
-                <a:latin typeface="Courier"/>
-              </a:rPr>
-              <a:t>-</a:t>
-            </a:r>
-            <a:br/>
-            <a:r>
-              <a:rPr sz="1800">
-                <a:solidFill>
-                  <a:srgbClr val="4070A0"/>
-                </a:solidFill>
-                <a:latin typeface="Courier"/>
-              </a:rPr>
-              <a:t>    </a:t>
-            </a:r>
-            <a:r>
-              <a:rPr sz="1800" b="1">
-                <a:solidFill>
-                  <a:srgbClr val="007020"/>
-                </a:solidFill>
-                <a:latin typeface="Courier"/>
-              </a:rPr>
-              <a:t>dmy</a:t>
-            </a:r>
-            <a:r>
-              <a:rPr sz="1800">
-                <a:latin typeface="Courier"/>
-              </a:rPr>
-              <a:t>(admission)))</a:t>
-            </a:r>
-          </a:p>
-        </p:txBody>
-      </p:sp>
-    </p:spTree>
-  </p:cSld>
-</p:sld>
-</file>
-
-<file path=ppt/slides/slide3.xml><?xml version="1.0" encoding="utf-8"?>
-<p:sld xmlns:a="http://schemas.openxmlformats.org/drawingml/2006/main" xmlns:r="http://schemas.openxmlformats.org/officeDocument/2006/relationships" xmlns:p="http://schemas.openxmlformats.org/presentationml/2006/main">
-  <p:cSld>
-    <p:spTree>
-      <p:nvGrpSpPr>
-        <p:cNvPr id="1" name=""/>
-        <p:cNvGrpSpPr/>
-        <p:nvPr/>
-      </p:nvGrpSpPr>
-      <p:grpSpPr>
-        <a:xfrm>
-          <a:off x="0" y="0"/>
-          <a:ext cx="0" cy="0"/>
-          <a:chOff x="0" y="0"/>
-          <a:chExt cx="0" cy="0"/>
-        </a:xfrm>
-      </p:grpSpPr>
-      <p:sp>
-        <p:nvSpPr>
-          <p:cNvPr id="2" name="Title 1">
-            <a:extLst>
-              <a:ext uri="{FF2B5EF4-FFF2-40B4-BE49-F238E27FC236}">
-                <a16:creationId xmlns:a16="http://schemas.microsoft.com/office/drawing/2014/main" id="{5567D468-EE70-CD4E-A3AC-039CC11EF1FB}"/>
-              </a:ext>
-            </a:extLst>
-          </p:cNvPr>
-          <p:cNvSpPr>
-            <a:spLocks noGrp="1"/>
-          </p:cNvSpPr>
-          <p:nvPr>
-            <p:ph type="title"/>
-          </p:nvPr>
-        </p:nvSpPr>
-        <p:spPr/>
-        <p:txBody>
-          <a:bodyPr/>
-          <a:lstStyle/>
-          <a:p>
-            <a:pPr lvl="0" marL="0" indent="0">
-              <a:buNone/>
-            </a:pPr>
-            <a:r>
-              <a:rPr/>
-              <a:t>Content</a:t>
-            </a:r>
-          </a:p>
-        </p:txBody>
-      </p:sp>
-      <p:sp>
-        <p:nvSpPr>
-          <p:cNvPr id="3" name="Content Placeholder 2">
-            <a:extLst>
-              <a:ext uri="{FF2B5EF4-FFF2-40B4-BE49-F238E27FC236}">
-                <a16:creationId xmlns:a16="http://schemas.microsoft.com/office/drawing/2014/main" id="{D10DDA37-E46B-B641-BC9F-636CB92A2C08}"/>
-              </a:ext>
-            </a:extLst>
-          </p:cNvPr>
-          <p:cNvSpPr>
-            <a:spLocks noGrp="1"/>
-          </p:cNvSpPr>
-          <p:nvPr>
-            <p:ph idx="1"/>
-          </p:nvPr>
-        </p:nvSpPr>
-        <p:spPr/>
-        <p:txBody>
-          <a:bodyPr/>
-          <a:lstStyle/>
-          <a:p>
-            <a:pPr lvl="1"/>
-            <a:r>
-              <a:rPr/>
-              <a:t>Using the </a:t>
-            </a:r>
-            <a:r>
-              <a:rPr sz="1800">
-                <a:latin typeface="Courier"/>
-              </a:rPr>
-              <a:t>dplyr</a:t>
-            </a:r>
-            <a:r>
-              <a:rPr/>
-              <a:t> package.</a:t>
-            </a:r>
-          </a:p>
-          <a:p>
-            <a:pPr lvl="1"/>
-            <a:r>
-              <a:rPr/>
-              <a:t>Standard methods for selecting data</a:t>
-            </a:r>
-          </a:p>
-          <a:p>
-            <a:pPr lvl="1"/>
-            <a:r>
-              <a:rPr/>
-              <a:t>Recipies to perform common operations</a:t>
-            </a:r>
-          </a:p>
-          <a:p>
-            <a:pPr lvl="2"/>
-            <a:r>
-              <a:rPr/>
-              <a:t>Manipulating strings</a:t>
-            </a:r>
-          </a:p>
-          <a:p>
-            <a:pPr lvl="2"/>
-            <a:r>
-              <a:rPr/>
-              <a:t>Manipulating dates</a:t>
-            </a:r>
-          </a:p>
-          <a:p>
-            <a:pPr lvl="2"/>
-            <a:r>
-              <a:rPr/>
-              <a:t>Changing data structure</a:t>
-            </a:r>
-          </a:p>
-        </p:txBody>
-      </p:sp>
-    </p:spTree>
-  </p:cSld>
-</p:sld>
-</file>
-
-<file path=ppt/slides/slide30.xml><?xml version="1.0" encoding="utf-8"?>
 <p:sld xmlns:a="http://schemas.openxmlformats.org/drawingml/2006/main" xmlns:r="http://schemas.openxmlformats.org/officeDocument/2006/relationships" xmlns:p="http://schemas.openxmlformats.org/presentationml/2006/main">
   <p:cSld>
     <p:spTree>
@@ -9538,6 +9291,503 @@
 </p:sld>
 </file>
 
+<file path=ppt/slides/slide29.xml><?xml version="1.0" encoding="utf-8"?>
+<p:sld xmlns:a="http://schemas.openxmlformats.org/drawingml/2006/main" xmlns:r="http://schemas.openxmlformats.org/officeDocument/2006/relationships" xmlns:p="http://schemas.openxmlformats.org/presentationml/2006/main">
+  <p:cSld>
+    <p:spTree>
+      <p:nvGrpSpPr>
+        <p:cNvPr id="1" name=""/>
+        <p:cNvGrpSpPr/>
+        <p:nvPr/>
+      </p:nvGrpSpPr>
+      <p:grpSpPr>
+        <a:xfrm>
+          <a:off x="0" y="0"/>
+          <a:ext cx="0" cy="0"/>
+          <a:chOff x="0" y="0"/>
+          <a:chExt cx="0" cy="0"/>
+        </a:xfrm>
+      </p:grpSpPr>
+      <p:sp>
+        <p:nvSpPr>
+          <p:cNvPr id="2" name="Title 1">
+            <a:extLst>
+              <a:ext uri="{FF2B5EF4-FFF2-40B4-BE49-F238E27FC236}">
+                <a16:creationId xmlns:a16="http://schemas.microsoft.com/office/drawing/2014/main" id="{5567D468-EE70-CD4E-A3AC-039CC11EF1FB}"/>
+              </a:ext>
+            </a:extLst>
+          </p:cNvPr>
+          <p:cNvSpPr>
+            <a:spLocks noGrp="1"/>
+          </p:cNvSpPr>
+          <p:nvPr>
+            <p:ph type="title"/>
+          </p:nvPr>
+        </p:nvSpPr>
+        <p:spPr/>
+        <p:txBody>
+          <a:bodyPr/>
+          <a:lstStyle/>
+          <a:p>
+            <a:pPr lvl="0" marL="0" indent="0">
+              <a:buNone/>
+            </a:pPr>
+            <a:r>
+              <a:rPr/>
+              <a:t>Why</a:t>
+            </a:r>
+            <a:r>
+              <a:rPr/>
+              <a:t> </a:t>
+            </a:r>
+            <a:r>
+              <a:rPr/>
+              <a:t>do</a:t>
+            </a:r>
+            <a:r>
+              <a:rPr/>
+              <a:t> </a:t>
+            </a:r>
+            <a:r>
+              <a:rPr/>
+              <a:t>this?</a:t>
+            </a:r>
+          </a:p>
+        </p:txBody>
+      </p:sp>
+      <p:sp>
+        <p:nvSpPr>
+          <p:cNvPr id="3" name="Content Placeholder 2">
+            <a:extLst>
+              <a:ext uri="{FF2B5EF4-FFF2-40B4-BE49-F238E27FC236}">
+                <a16:creationId xmlns:a16="http://schemas.microsoft.com/office/drawing/2014/main" id="{D10DDA37-E46B-B641-BC9F-636CB92A2C08}"/>
+              </a:ext>
+            </a:extLst>
+          </p:cNvPr>
+          <p:cNvSpPr>
+            <a:spLocks noGrp="1"/>
+          </p:cNvSpPr>
+          <p:nvPr>
+            <p:ph idx="1"/>
+          </p:nvPr>
+        </p:nvSpPr>
+        <p:spPr/>
+        <p:txBody>
+          <a:bodyPr/>
+          <a:lstStyle/>
+          <a:p>
+            <a:pPr lvl="1"/>
+            <a:r>
+              <a:rPr/>
+              <a:t>You may want to calculate the mean and standard deviation of all temperatures, and don’t care about the source.</a:t>
+            </a:r>
+          </a:p>
+          <a:p>
+            <a:pPr lvl="1"/>
+            <a:r>
+              <a:rPr/>
+              <a:t>You may want to plot all temperatures on a graph.</a:t>
+            </a:r>
+          </a:p>
+          <a:p>
+            <a:pPr lvl="1"/>
+            <a:r>
+              <a:rPr/>
+              <a:t>Instead of temperature area, you may have temperature on day 1, 2 etc.</a:t>
+            </a:r>
+          </a:p>
+        </p:txBody>
+      </p:sp>
+    </p:spTree>
+  </p:cSld>
+</p:sld>
+</file>
+
+<file path=ppt/slides/slide3.xml><?xml version="1.0" encoding="utf-8"?>
+<p:sld xmlns:a="http://schemas.openxmlformats.org/drawingml/2006/main" xmlns:r="http://schemas.openxmlformats.org/officeDocument/2006/relationships" xmlns:p="http://schemas.openxmlformats.org/presentationml/2006/main">
+  <p:cSld>
+    <p:spTree>
+      <p:nvGrpSpPr>
+        <p:cNvPr id="1" name=""/>
+        <p:cNvGrpSpPr/>
+        <p:nvPr/>
+      </p:nvGrpSpPr>
+      <p:grpSpPr>
+        <a:xfrm>
+          <a:off x="0" y="0"/>
+          <a:ext cx="0" cy="0"/>
+          <a:chOff x="0" y="0"/>
+          <a:chExt cx="0" cy="0"/>
+        </a:xfrm>
+      </p:grpSpPr>
+      <p:sp>
+        <p:nvSpPr>
+          <p:cNvPr id="2" name="Title 1">
+            <a:extLst>
+              <a:ext uri="{FF2B5EF4-FFF2-40B4-BE49-F238E27FC236}">
+                <a16:creationId xmlns:a16="http://schemas.microsoft.com/office/drawing/2014/main" id="{5567D468-EE70-CD4E-A3AC-039CC11EF1FB}"/>
+              </a:ext>
+            </a:extLst>
+          </p:cNvPr>
+          <p:cNvSpPr>
+            <a:spLocks noGrp="1"/>
+          </p:cNvSpPr>
+          <p:nvPr>
+            <p:ph type="title"/>
+          </p:nvPr>
+        </p:nvSpPr>
+        <p:spPr/>
+        <p:txBody>
+          <a:bodyPr/>
+          <a:lstStyle/>
+          <a:p>
+            <a:pPr lvl="0" marL="0" indent="0">
+              <a:buNone/>
+            </a:pPr>
+            <a:r>
+              <a:rPr/>
+              <a:t>Content</a:t>
+            </a:r>
+          </a:p>
+        </p:txBody>
+      </p:sp>
+      <p:sp>
+        <p:nvSpPr>
+          <p:cNvPr id="3" name="Content Placeholder 2">
+            <a:extLst>
+              <a:ext uri="{FF2B5EF4-FFF2-40B4-BE49-F238E27FC236}">
+                <a16:creationId xmlns:a16="http://schemas.microsoft.com/office/drawing/2014/main" id="{D10DDA37-E46B-B641-BC9F-636CB92A2C08}"/>
+              </a:ext>
+            </a:extLst>
+          </p:cNvPr>
+          <p:cNvSpPr>
+            <a:spLocks noGrp="1"/>
+          </p:cNvSpPr>
+          <p:nvPr>
+            <p:ph idx="1"/>
+          </p:nvPr>
+        </p:nvSpPr>
+        <p:spPr/>
+        <p:txBody>
+          <a:bodyPr/>
+          <a:lstStyle/>
+          <a:p>
+            <a:pPr lvl="1"/>
+            <a:r>
+              <a:rPr/>
+              <a:t>Using the </a:t>
+            </a:r>
+            <a:r>
+              <a:rPr sz="1800">
+                <a:latin typeface="Courier"/>
+              </a:rPr>
+              <a:t>dplyr</a:t>
+            </a:r>
+            <a:r>
+              <a:rPr/>
+              <a:t> package.</a:t>
+            </a:r>
+          </a:p>
+          <a:p>
+            <a:pPr lvl="1"/>
+            <a:r>
+              <a:rPr/>
+              <a:t>Standard methods for selecting data</a:t>
+            </a:r>
+          </a:p>
+          <a:p>
+            <a:pPr lvl="1"/>
+            <a:r>
+              <a:rPr/>
+              <a:t>Recipies to perform common operations</a:t>
+            </a:r>
+          </a:p>
+          <a:p>
+            <a:pPr lvl="2"/>
+            <a:r>
+              <a:rPr/>
+              <a:t>Manipulating strings</a:t>
+            </a:r>
+          </a:p>
+          <a:p>
+            <a:pPr lvl="2"/>
+            <a:r>
+              <a:rPr/>
+              <a:t>Manipulating dates</a:t>
+            </a:r>
+          </a:p>
+          <a:p>
+            <a:pPr lvl="2"/>
+            <a:r>
+              <a:rPr/>
+              <a:t>Changing data structure</a:t>
+            </a:r>
+          </a:p>
+        </p:txBody>
+      </p:sp>
+    </p:spTree>
+  </p:cSld>
+</p:sld>
+</file>
+
+<file path=ppt/slides/slide30.xml><?xml version="1.0" encoding="utf-8"?>
+<p:sld xmlns:a="http://schemas.openxmlformats.org/drawingml/2006/main" xmlns:r="http://schemas.openxmlformats.org/officeDocument/2006/relationships" xmlns:p="http://schemas.openxmlformats.org/presentationml/2006/main">
+  <p:cSld>
+    <p:spTree>
+      <p:nvGrpSpPr>
+        <p:cNvPr id="1" name=""/>
+        <p:cNvGrpSpPr/>
+        <p:nvPr/>
+      </p:nvGrpSpPr>
+      <p:grpSpPr>
+        <a:xfrm>
+          <a:off x="0" y="0"/>
+          <a:ext cx="0" cy="0"/>
+          <a:chOff x="0" y="0"/>
+          <a:chExt cx="0" cy="0"/>
+        </a:xfrm>
+      </p:grpSpPr>
+      <p:sp>
+        <p:nvSpPr>
+          <p:cNvPr id="2" name="Title 1">
+            <a:extLst>
+              <a:ext uri="{FF2B5EF4-FFF2-40B4-BE49-F238E27FC236}">
+                <a16:creationId xmlns:a16="http://schemas.microsoft.com/office/drawing/2014/main" id="{5567D468-EE70-CD4E-A3AC-039CC11EF1FB}"/>
+              </a:ext>
+            </a:extLst>
+          </p:cNvPr>
+          <p:cNvSpPr>
+            <a:spLocks noGrp="1"/>
+          </p:cNvSpPr>
+          <p:nvPr>
+            <p:ph type="title"/>
+          </p:nvPr>
+        </p:nvSpPr>
+        <p:spPr/>
+        <p:txBody>
+          <a:bodyPr/>
+          <a:lstStyle/>
+          <a:p>
+            <a:pPr lvl="0" marL="0" indent="0">
+              <a:buNone/>
+            </a:pPr>
+            <a:r>
+              <a:rPr/>
+              <a:t>Converting</a:t>
+            </a:r>
+            <a:r>
+              <a:rPr/>
+              <a:t> </a:t>
+            </a:r>
+            <a:r>
+              <a:rPr/>
+              <a:t>the</a:t>
+            </a:r>
+            <a:r>
+              <a:rPr/>
+              <a:t> </a:t>
+            </a:r>
+            <a:r>
+              <a:rPr/>
+              <a:t>data</a:t>
+            </a:r>
+          </a:p>
+        </p:txBody>
+      </p:sp>
+      <p:sp>
+        <p:nvSpPr>
+          <p:cNvPr id="3" name="Content Placeholder 2">
+            <a:extLst>
+              <a:ext uri="{FF2B5EF4-FFF2-40B4-BE49-F238E27FC236}">
+                <a16:creationId xmlns:a16="http://schemas.microsoft.com/office/drawing/2014/main" id="{D10DDA37-E46B-B641-BC9F-636CB92A2C08}"/>
+              </a:ext>
+            </a:extLst>
+          </p:cNvPr>
+          <p:cNvSpPr>
+            <a:spLocks noGrp="1"/>
+          </p:cNvSpPr>
+          <p:nvPr>
+            <p:ph idx="1"/>
+          </p:nvPr>
+        </p:nvSpPr>
+        <p:spPr/>
+        <p:txBody>
+          <a:bodyPr/>
+          <a:lstStyle/>
+          <a:p>
+            <a:pPr lvl="0" marL="1270000" indent="0">
+              <a:buNone/>
+            </a:pPr>
+            <a:r>
+              <a:rPr sz="1800" b="1">
+                <a:solidFill>
+                  <a:srgbClr val="007020"/>
+                </a:solidFill>
+                <a:latin typeface="Courier"/>
+              </a:rPr>
+              <a:t>library</a:t>
+            </a:r>
+            <a:r>
+              <a:rPr sz="1800">
+                <a:latin typeface="Courier"/>
+              </a:rPr>
+              <a:t>(tidyr)</a:t>
+            </a:r>
+            <a:br/>
+            <a:r>
+              <a:rPr sz="1800">
+                <a:latin typeface="Courier"/>
+              </a:rPr>
+              <a:t>cchic</a:t>
+            </a:r>
+            <a:br/>
+            <a:br/>
+            <a:r>
+              <a:rPr sz="1800">
+                <a:latin typeface="Courier"/>
+              </a:rPr>
+              <a:t>cchic_long &lt;-</a:t>
+            </a:r>
+            <a:r>
+              <a:rPr sz="1800">
+                <a:solidFill>
+                  <a:srgbClr val="4070A0"/>
+                </a:solidFill>
+                <a:latin typeface="Courier"/>
+              </a:rPr>
+              <a:t> </a:t>
+            </a:r>
+            <a:r>
+              <a:rPr sz="1800">
+                <a:latin typeface="Courier"/>
+              </a:rPr>
+              <a:t>cchic </a:t>
+            </a:r>
+            <a:r>
+              <a:rPr sz="1800">
+                <a:solidFill>
+                  <a:srgbClr val="666666"/>
+                </a:solidFill>
+                <a:latin typeface="Courier"/>
+              </a:rPr>
+              <a:t>%&gt;%</a:t>
+            </a:r>
+            <a:br/>
+            <a:r>
+              <a:rPr sz="1800">
+                <a:solidFill>
+                  <a:srgbClr val="4070A0"/>
+                </a:solidFill>
+                <a:latin typeface="Courier"/>
+              </a:rPr>
+              <a:t>  </a:t>
+            </a:r>
+            <a:r>
+              <a:rPr sz="1800" b="1">
+                <a:solidFill>
+                  <a:srgbClr val="007020"/>
+                </a:solidFill>
+                <a:latin typeface="Courier"/>
+              </a:rPr>
+              <a:t>gather</a:t>
+            </a:r>
+            <a:r>
+              <a:rPr sz="1800">
+                <a:latin typeface="Courier"/>
+              </a:rPr>
+              <a:t>(</a:t>
+            </a:r>
+            <a:br/>
+            <a:r>
+              <a:rPr sz="1800">
+                <a:latin typeface="Courier"/>
+              </a:rPr>
+              <a:t>    </a:t>
+            </a:r>
+            <a:r>
+              <a:rPr sz="1800">
+                <a:solidFill>
+                  <a:srgbClr val="4070A0"/>
+                </a:solidFill>
+                <a:latin typeface="Courier"/>
+              </a:rPr>
+              <a:t>"temp_point"</a:t>
+            </a:r>
+            <a:r>
+              <a:rPr sz="1800">
+                <a:latin typeface="Courier"/>
+              </a:rPr>
+              <a:t>, </a:t>
+            </a:r>
+            <a:r>
+              <a:rPr sz="1800">
+                <a:solidFill>
+                  <a:srgbClr val="4070A0"/>
+                </a:solidFill>
+                <a:latin typeface="Courier"/>
+              </a:rPr>
+              <a:t>"temperature"</a:t>
+            </a:r>
+            <a:r>
+              <a:rPr sz="1800">
+                <a:latin typeface="Courier"/>
+              </a:rPr>
+              <a:t>,</a:t>
+            </a:r>
+            <a:br/>
+            <a:r>
+              <a:rPr sz="1800">
+                <a:latin typeface="Courier"/>
+              </a:rPr>
+              <a:t>    temp_c</a:t>
+            </a:r>
+            <a:r>
+              <a:rPr sz="1800">
+                <a:solidFill>
+                  <a:srgbClr val="666666"/>
+                </a:solidFill>
+                <a:latin typeface="Courier"/>
+              </a:rPr>
+              <a:t>:</a:t>
+            </a:r>
+            <a:r>
+              <a:rPr sz="1800">
+                <a:latin typeface="Courier"/>
+              </a:rPr>
+              <a:t>temp_nc</a:t>
+            </a:r>
+            <a:br/>
+            <a:r>
+              <a:rPr sz="1800">
+                <a:latin typeface="Courier"/>
+              </a:rPr>
+              <a:t>  )</a:t>
+            </a:r>
+            <a:br/>
+            <a:br/>
+            <a:r>
+              <a:rPr sz="1800" b="1">
+                <a:solidFill>
+                  <a:srgbClr val="007020"/>
+                </a:solidFill>
+                <a:latin typeface="Courier"/>
+              </a:rPr>
+              <a:t>names</a:t>
+            </a:r>
+            <a:r>
+              <a:rPr sz="1800">
+                <a:latin typeface="Courier"/>
+              </a:rPr>
+              <a:t>(cchic_long)</a:t>
+            </a:r>
+          </a:p>
+        </p:txBody>
+      </p:sp>
+    </p:spTree>
+  </p:cSld>
+</p:sld>
+</file>
+
 <file path=ppt/slides/slide31.xml><?xml version="1.0" encoding="utf-8"?>
 <p:sld xmlns:a="http://schemas.openxmlformats.org/drawingml/2006/main" xmlns:r="http://schemas.openxmlformats.org/officeDocument/2006/relationships" xmlns:p="http://schemas.openxmlformats.org/presentationml/2006/main">
   <p:cSld>
@@ -9581,23 +9831,63 @@
             </a:pPr>
             <a:r>
               <a:rPr/>
-              <a:t>Why</a:t>
-            </a:r>
-            <a:r>
-              <a:rPr/>
-              <a:t> </a:t>
-            </a:r>
-            <a:r>
-              <a:rPr/>
-              <a:t>do</a:t>
-            </a:r>
-            <a:r>
-              <a:rPr/>
-              <a:t> </a:t>
-            </a:r>
-            <a:r>
-              <a:rPr/>
-              <a:t>this?</a:t>
+              <a:t>This</a:t>
+            </a:r>
+            <a:r>
+              <a:rPr/>
+              <a:t> </a:t>
+            </a:r>
+            <a:r>
+              <a:rPr/>
+              <a:t>is</a:t>
+            </a:r>
+            <a:r>
+              <a:rPr/>
+              <a:t> </a:t>
+            </a:r>
+            <a:r>
+              <a:rPr/>
+              <a:t>why</a:t>
+            </a:r>
+            <a:r>
+              <a:rPr/>
+              <a:t> </a:t>
+            </a:r>
+            <a:r>
+              <a:rPr/>
+              <a:t>we</a:t>
+            </a:r>
+            <a:r>
+              <a:rPr/>
+              <a:t> </a:t>
+            </a:r>
+            <a:r>
+              <a:rPr/>
+              <a:t>‘</a:t>
+            </a:r>
+            <a:r>
+              <a:rPr/>
+              <a:t>gathered</a:t>
+            </a:r>
+            <a:r>
+              <a:rPr/>
+              <a:t>’</a:t>
+            </a:r>
+            <a:r>
+              <a:rPr/>
+              <a:t> </a:t>
+            </a:r>
+            <a:r>
+              <a:rPr/>
+              <a:t>the</a:t>
+            </a:r>
+            <a:r>
+              <a:rPr/>
+              <a:t> </a:t>
+            </a:r>
+            <a:r>
+              <a:rPr/>
+              <a:t>data</a:t>
             </a:r>
           </a:p>
         </p:txBody>
@@ -9623,24 +9913,173 @@
           <a:bodyPr/>
           <a:lstStyle/>
           <a:p>
-            <a:pPr lvl="1"/>
-            <a:r>
-              <a:rPr/>
-              <a:t>You may want to calculate the mean and standard deviation of all temperatures, and don’t care about the source.</a:t>
-            </a:r>
-          </a:p>
-          <a:p>
-            <a:pPr lvl="1"/>
-            <a:r>
-              <a:rPr/>
-              <a:t>You may want to plot all temperatures on a graph.</a:t>
-            </a:r>
-          </a:p>
-          <a:p>
-            <a:pPr lvl="1"/>
-            <a:r>
-              <a:rPr/>
-              <a:t>Instead of temperature area, you may have temperature on day 1, 2 etc.</a:t>
+            <a:pPr lvl="0" marL="1270000" indent="0">
+              <a:buNone/>
+            </a:pPr>
+            <a:r>
+              <a:rPr sz="1800" b="1">
+                <a:solidFill>
+                  <a:srgbClr val="007020"/>
+                </a:solidFill>
+                <a:latin typeface="Courier"/>
+              </a:rPr>
+              <a:t>library</a:t>
+            </a:r>
+            <a:r>
+              <a:rPr sz="1800">
+                <a:latin typeface="Courier"/>
+              </a:rPr>
+              <a:t>(ggplot2)</a:t>
+            </a:r>
+            <a:br/>
+            <a:r>
+              <a:rPr sz="1800">
+                <a:latin typeface="Courier"/>
+              </a:rPr>
+              <a:t>cchic_long </a:t>
+            </a:r>
+            <a:r>
+              <a:rPr sz="1800">
+                <a:solidFill>
+                  <a:srgbClr val="666666"/>
+                </a:solidFill>
+                <a:latin typeface="Courier"/>
+              </a:rPr>
+              <a:t>%&gt;%</a:t>
+            </a:r>
+            <a:br/>
+            <a:r>
+              <a:rPr sz="1800">
+                <a:solidFill>
+                  <a:srgbClr val="4070A0"/>
+                </a:solidFill>
+                <a:latin typeface="Courier"/>
+              </a:rPr>
+              <a:t>  </a:t>
+            </a:r>
+            <a:r>
+              <a:rPr sz="1800" b="1">
+                <a:solidFill>
+                  <a:srgbClr val="007020"/>
+                </a:solidFill>
+                <a:latin typeface="Courier"/>
+              </a:rPr>
+              <a:t>ggplot</a:t>
+            </a:r>
+            <a:r>
+              <a:rPr sz="1800">
+                <a:latin typeface="Courier"/>
+              </a:rPr>
+              <a:t>(</a:t>
+            </a:r>
+            <a:r>
+              <a:rPr sz="1800" b="1">
+                <a:solidFill>
+                  <a:srgbClr val="007020"/>
+                </a:solidFill>
+                <a:latin typeface="Courier"/>
+              </a:rPr>
+              <a:t>aes</a:t>
+            </a:r>
+            <a:r>
+              <a:rPr sz="1800">
+                <a:latin typeface="Courier"/>
+              </a:rPr>
+              <a:t>(</a:t>
+            </a:r>
+            <a:br/>
+            <a:r>
+              <a:rPr sz="1800">
+                <a:latin typeface="Courier"/>
+              </a:rPr>
+              <a:t>    </a:t>
+            </a:r>
+            <a:r>
+              <a:rPr sz="1800">
+                <a:solidFill>
+                  <a:srgbClr val="902000"/>
+                </a:solidFill>
+                <a:latin typeface="Courier"/>
+              </a:rPr>
+              <a:t>x =</a:t>
+            </a:r>
+            <a:r>
+              <a:rPr sz="1800">
+                <a:latin typeface="Courier"/>
+              </a:rPr>
+              <a:t> temp_point, </a:t>
+            </a:r>
+            <a:r>
+              <a:rPr sz="1800">
+                <a:solidFill>
+                  <a:srgbClr val="902000"/>
+                </a:solidFill>
+                <a:latin typeface="Courier"/>
+              </a:rPr>
+              <a:t>y =</a:t>
+            </a:r>
+            <a:br/>
+            <a:r>
+              <a:rPr sz="1800">
+                <a:latin typeface="Courier"/>
+              </a:rPr>
+              <a:t>      </a:t>
+            </a:r>
+            <a:r>
+              <a:rPr sz="1800" b="1">
+                <a:solidFill>
+                  <a:srgbClr val="007020"/>
+                </a:solidFill>
+                <a:latin typeface="Courier"/>
+              </a:rPr>
+              <a:t>as.numeric</a:t>
+            </a:r>
+            <a:r>
+              <a:rPr sz="1800">
+                <a:latin typeface="Courier"/>
+              </a:rPr>
+              <a:t>(temperature)</a:t>
+            </a:r>
+            <a:br/>
+            <a:r>
+              <a:rPr sz="1800">
+                <a:latin typeface="Courier"/>
+              </a:rPr>
+              <a:t>  )) </a:t>
+            </a:r>
+            <a:r>
+              <a:rPr sz="1800">
+                <a:solidFill>
+                  <a:srgbClr val="666666"/>
+                </a:solidFill>
+                <a:latin typeface="Courier"/>
+              </a:rPr>
+              <a:t>+</a:t>
+            </a:r>
+            <a:br/>
+            <a:r>
+              <a:rPr sz="1800">
+                <a:solidFill>
+                  <a:srgbClr val="4070A0"/>
+                </a:solidFill>
+                <a:latin typeface="Courier"/>
+              </a:rPr>
+              <a:t>  </a:t>
+            </a:r>
+            <a:r>
+              <a:rPr sz="1800" b="1">
+                <a:solidFill>
+                  <a:srgbClr val="007020"/>
+                </a:solidFill>
+                <a:latin typeface="Courier"/>
+              </a:rPr>
+              <a:t>geom_boxplot</a:t>
+            </a:r>
+            <a:r>
+              <a:rPr sz="1800">
+                <a:latin typeface="Courier"/>
+              </a:rPr>
+              <a:t>()</a:t>
             </a:r>
           </a:p>
         </p:txBody>
@@ -9693,23 +10132,23 @@
             </a:pPr>
             <a:r>
               <a:rPr/>
-              <a:t>Converting</a:t>
-            </a:r>
-            <a:r>
-              <a:rPr/>
-              <a:t> </a:t>
-            </a:r>
-            <a:r>
-              <a:rPr/>
-              <a:t>the</a:t>
-            </a:r>
-            <a:r>
-              <a:rPr/>
-              <a:t> </a:t>
-            </a:r>
-            <a:r>
-              <a:rPr/>
-              <a:t>data</a:t>
+              <a:t>7.</a:t>
+            </a:r>
+            <a:r>
+              <a:rPr/>
+              <a:t> </a:t>
+            </a:r>
+            <a:r>
+              <a:rPr/>
+              <a:t>Deleting</a:t>
+            </a:r>
+            <a:r>
+              <a:rPr/>
+              <a:t> </a:t>
+            </a:r>
+            <a:r>
+              <a:rPr/>
+              <a:t>columns</a:t>
             </a:r>
           </a:p>
         </p:txBody>
@@ -9735,53 +10174,67 @@
           <a:bodyPr/>
           <a:lstStyle/>
           <a:p>
+            <a:pPr lvl="0" marL="0" indent="0">
+              <a:buNone/>
+            </a:pPr>
+            <a:r>
+              <a:rPr/>
+              <a:t>What if we wanted to remove the </a:t>
+            </a:r>
+            <a:r>
+              <a:rPr sz="1800">
+                <a:latin typeface="Courier"/>
+              </a:rPr>
+              <a:t>lactate</a:t>
+            </a:r>
+            <a:r>
+              <a:rPr/>
+              <a:t> variable?</a:t>
+            </a:r>
+          </a:p>
+          <a:p>
             <a:pPr lvl="0" marL="1270000" indent="0">
               <a:buNone/>
             </a:pPr>
             <a:r>
+              <a:rPr sz="1800">
+                <a:latin typeface="Courier"/>
+              </a:rPr>
+              <a:t>cchic </a:t>
+            </a:r>
+            <a:r>
+              <a:rPr sz="1800">
+                <a:solidFill>
+                  <a:srgbClr val="666666"/>
+                </a:solidFill>
+                <a:latin typeface="Courier"/>
+              </a:rPr>
+              <a:t>%&gt;%</a:t>
+            </a:r>
+            <a:br/>
+            <a:r>
+              <a:rPr sz="1800">
+                <a:solidFill>
+                  <a:srgbClr val="4070A0"/>
+                </a:solidFill>
+                <a:latin typeface="Courier"/>
+              </a:rPr>
+              <a:t>  </a:t>
+            </a:r>
+            <a:r>
               <a:rPr sz="1800" b="1">
                 <a:solidFill>
                   <a:srgbClr val="007020"/>
                 </a:solidFill>
                 <a:latin typeface="Courier"/>
               </a:rPr>
-              <a:t>library</a:t>
-            </a:r>
-            <a:r>
-              <a:rPr sz="1800">
-                <a:latin typeface="Courier"/>
-              </a:rPr>
-              <a:t>(tidyr)</a:t>
-            </a:r>
-            <a:br/>
-            <a:r>
-              <a:rPr sz="1800">
-                <a:latin typeface="Courier"/>
-              </a:rPr>
-              <a:t>cchic</a:t>
-            </a:r>
-            <a:br/>
-            <a:br/>
-            <a:r>
-              <a:rPr sz="1800">
-                <a:latin typeface="Courier"/>
-              </a:rPr>
-              <a:t>cchic_long &lt;-</a:t>
-            </a:r>
-            <a:r>
-              <a:rPr sz="1800">
-                <a:solidFill>
-                  <a:srgbClr val="4070A0"/>
-                </a:solidFill>
-                <a:latin typeface="Courier"/>
-              </a:rPr>
-              <a:t> </a:t>
-            </a:r>
-            <a:r>
-              <a:rPr sz="1800">
-                <a:latin typeface="Courier"/>
-              </a:rPr>
-              <a:t>cchic </a:t>
+              <a:t>select</a:t>
+            </a:r>
+            <a:r>
+              <a:rPr sz="1800">
+                <a:latin typeface="Courier"/>
+              </a:rPr>
+              <a:t>(</a:t>
             </a:r>
             <a:r>
               <a:rPr sz="1800">
@@ -9790,115 +10243,41 @@
                 </a:solidFill>
                 <a:latin typeface="Courier"/>
               </a:rPr>
-              <a:t>%&gt;%</a:t>
-            </a:r>
-            <a:br/>
-            <a:r>
-              <a:rPr sz="1800">
-                <a:solidFill>
-                  <a:srgbClr val="4070A0"/>
-                </a:solidFill>
-                <a:latin typeface="Courier"/>
-              </a:rPr>
-              <a:t>  </a:t>
-            </a:r>
-            <a:r>
-              <a:rPr sz="1800" b="1">
-                <a:solidFill>
-                  <a:srgbClr val="007020"/>
-                </a:solidFill>
-                <a:latin typeface="Courier"/>
-              </a:rPr>
-              <a:t>gather</a:t>
-            </a:r>
-            <a:r>
-              <a:rPr sz="1800">
-                <a:latin typeface="Courier"/>
-              </a:rPr>
-              <a:t>(</a:t>
-            </a:r>
-            <a:br/>
-            <a:r>
-              <a:rPr sz="1800">
-                <a:latin typeface="Courier"/>
-              </a:rPr>
-              <a:t>    </a:t>
-            </a:r>
-            <a:r>
-              <a:rPr sz="1800">
-                <a:solidFill>
-                  <a:srgbClr val="4070A0"/>
-                </a:solidFill>
-                <a:latin typeface="Courier"/>
-              </a:rPr>
-              <a:t>"temp_point"</a:t>
-            </a:r>
-            <a:r>
-              <a:rPr sz="1800">
-                <a:latin typeface="Courier"/>
-              </a:rPr>
-              <a:t>, </a:t>
-            </a:r>
-            <a:r>
-              <a:rPr sz="1800">
-                <a:solidFill>
-                  <a:srgbClr val="4070A0"/>
-                </a:solidFill>
-                <a:latin typeface="Courier"/>
-              </a:rPr>
-              <a:t>"temperature"</a:t>
-            </a:r>
-            <a:r>
-              <a:rPr sz="1800">
-                <a:latin typeface="Courier"/>
-              </a:rPr>
-              <a:t>,</a:t>
-            </a:r>
-            <a:br/>
-            <a:r>
-              <a:rPr sz="1800">
-                <a:latin typeface="Courier"/>
-              </a:rPr>
-              <a:t>    temp_c</a:t>
-            </a:r>
-            <a:r>
-              <a:rPr sz="1800">
-                <a:solidFill>
-                  <a:srgbClr val="666666"/>
-                </a:solidFill>
-                <a:latin typeface="Courier"/>
-              </a:rPr>
-              <a:t>:</a:t>
-            </a:r>
-            <a:r>
-              <a:rPr sz="1800">
-                <a:latin typeface="Courier"/>
-              </a:rPr>
-              <a:t>temp_nc</a:t>
-            </a:r>
-            <a:br/>
-            <a:r>
-              <a:rPr sz="1800">
-                <a:latin typeface="Courier"/>
-              </a:rPr>
-              <a:t>  )</a:t>
-            </a:r>
-            <a:br/>
-            <a:br/>
-            <a:r>
-              <a:rPr sz="1800" b="1">
-                <a:solidFill>
-                  <a:srgbClr val="007020"/>
-                </a:solidFill>
-                <a:latin typeface="Courier"/>
-              </a:rPr>
-              <a:t>names</a:t>
-            </a:r>
-            <a:r>
-              <a:rPr sz="1800">
-                <a:latin typeface="Courier"/>
-              </a:rPr>
-              <a:t>(cchic_long)</a:t>
+              <a:t>-</a:t>
+            </a:r>
+            <a:r>
+              <a:rPr sz="1800">
+                <a:latin typeface="Courier"/>
+              </a:rPr>
+              <a:t>lactate)</a:t>
+            </a:r>
+          </a:p>
+          <a:p>
+            <a:pPr lvl="0" marL="0" indent="0">
+              <a:buNone/>
+            </a:pPr>
+            <a:r>
+              <a:rPr/>
+              <a:t>The </a:t>
+            </a:r>
+            <a:r>
+              <a:rPr sz="1800">
+                <a:latin typeface="Courier"/>
+              </a:rPr>
+              <a:t>-</a:t>
+            </a:r>
+            <a:r>
+              <a:rPr/>
+              <a:t> sign means deselect here.</a:t>
+            </a:r>
+          </a:p>
+          <a:p>
+            <a:pPr lvl="0" marL="0" indent="0">
+              <a:buNone/>
+            </a:pPr>
+            <a:r>
+              <a:rPr/>
+              <a:t>Don’t forget to assign the above code to something, otherwise the output won’t be saved.</a:t>
             </a:r>
           </a:p>
         </p:txBody>
@@ -9951,63 +10330,7 @@
             </a:pPr>
             <a:r>
               <a:rPr/>
-              <a:t>This</a:t>
-            </a:r>
-            <a:r>
-              <a:rPr/>
-              <a:t> </a:t>
-            </a:r>
-            <a:r>
-              <a:rPr/>
-              <a:t>is</a:t>
-            </a:r>
-            <a:r>
-              <a:rPr/>
-              <a:t> </a:t>
-            </a:r>
-            <a:r>
-              <a:rPr/>
-              <a:t>why</a:t>
-            </a:r>
-            <a:r>
-              <a:rPr/>
-              <a:t> </a:t>
-            </a:r>
-            <a:r>
-              <a:rPr/>
-              <a:t>we</a:t>
-            </a:r>
-            <a:r>
-              <a:rPr/>
-              <a:t> </a:t>
-            </a:r>
-            <a:r>
-              <a:rPr/>
-              <a:t>‘</a:t>
-            </a:r>
-            <a:r>
-              <a:rPr/>
-              <a:t>gathered</a:t>
-            </a:r>
-            <a:r>
-              <a:rPr/>
-              <a:t>’</a:t>
-            </a:r>
-            <a:r>
-              <a:rPr/>
-              <a:t> </a:t>
-            </a:r>
-            <a:r>
-              <a:rPr/>
-              <a:t>the</a:t>
-            </a:r>
-            <a:r>
-              <a:rPr/>
-              <a:t> </a:t>
-            </a:r>
-            <a:r>
-              <a:rPr/>
-              <a:t>data</a:t>
+              <a:t>Excercise</a:t>
             </a:r>
           </a:p>
         </p:txBody>
@@ -10033,173 +10356,69 @@
           <a:bodyPr/>
           <a:lstStyle/>
           <a:p>
-            <a:pPr lvl="0" marL="1270000" indent="0">
-              <a:buNone/>
+            <a:pPr lvl="1">
+              <a:buAutoNum type="arabicPeriod"/>
             </a:pPr>
             <a:r>
-              <a:rPr sz="1800" b="1">
-                <a:solidFill>
-                  <a:srgbClr val="007020"/>
-                </a:solidFill>
-                <a:latin typeface="Courier"/>
-              </a:rPr>
-              <a:t>library</a:t>
-            </a:r>
-            <a:r>
-              <a:rPr sz="1800">
-                <a:latin typeface="Courier"/>
-              </a:rPr>
-              <a:t>(ggplot2)</a:t>
-            </a:r>
-            <a:br/>
-            <a:r>
-              <a:rPr sz="1800">
-                <a:latin typeface="Courier"/>
-              </a:rPr>
-              <a:t>cchic_long </a:t>
-            </a:r>
-            <a:r>
-              <a:rPr sz="1800">
-                <a:solidFill>
-                  <a:srgbClr val="666666"/>
-                </a:solidFill>
-                <a:latin typeface="Courier"/>
-              </a:rPr>
-              <a:t>%&gt;%</a:t>
-            </a:r>
-            <a:br/>
-            <a:r>
-              <a:rPr sz="1800">
-                <a:solidFill>
-                  <a:srgbClr val="4070A0"/>
-                </a:solidFill>
-                <a:latin typeface="Courier"/>
-              </a:rPr>
-              <a:t>  </a:t>
-            </a:r>
-            <a:r>
-              <a:rPr sz="1800" b="1">
-                <a:solidFill>
-                  <a:srgbClr val="007020"/>
-                </a:solidFill>
-                <a:latin typeface="Courier"/>
-              </a:rPr>
-              <a:t>ggplot</a:t>
-            </a:r>
-            <a:r>
-              <a:rPr sz="1800">
-                <a:latin typeface="Courier"/>
-              </a:rPr>
-              <a:t>(</a:t>
-            </a:r>
-            <a:r>
-              <a:rPr sz="1800" b="1">
-                <a:solidFill>
-                  <a:srgbClr val="007020"/>
-                </a:solidFill>
-                <a:latin typeface="Courier"/>
-              </a:rPr>
-              <a:t>aes</a:t>
-            </a:r>
-            <a:r>
-              <a:rPr sz="1800">
-                <a:latin typeface="Courier"/>
-              </a:rPr>
-              <a:t>(</a:t>
-            </a:r>
-            <a:br/>
-            <a:r>
-              <a:rPr sz="1800">
-                <a:latin typeface="Courier"/>
-              </a:rPr>
-              <a:t>    </a:t>
-            </a:r>
-            <a:r>
-              <a:rPr sz="1800">
-                <a:solidFill>
-                  <a:srgbClr val="902000"/>
-                </a:solidFill>
-                <a:latin typeface="Courier"/>
-              </a:rPr>
-              <a:t>x =</a:t>
-            </a:r>
-            <a:r>
-              <a:rPr sz="1800">
-                <a:latin typeface="Courier"/>
-              </a:rPr>
-              <a:t> temp_point, </a:t>
-            </a:r>
-            <a:r>
-              <a:rPr sz="1800">
-                <a:solidFill>
-                  <a:srgbClr val="902000"/>
-                </a:solidFill>
-                <a:latin typeface="Courier"/>
-              </a:rPr>
-              <a:t>y =</a:t>
-            </a:r>
-            <a:br/>
-            <a:r>
-              <a:rPr sz="1800">
-                <a:latin typeface="Courier"/>
-              </a:rPr>
-              <a:t>      </a:t>
-            </a:r>
-            <a:r>
-              <a:rPr sz="1800" b="1">
-                <a:solidFill>
-                  <a:srgbClr val="007020"/>
-                </a:solidFill>
-                <a:latin typeface="Courier"/>
-              </a:rPr>
-              <a:t>as.numeric</a:t>
-            </a:r>
-            <a:r>
-              <a:rPr sz="1800">
-                <a:latin typeface="Courier"/>
-              </a:rPr>
-              <a:t>(temperature)</a:t>
-            </a:r>
-            <a:br/>
-            <a:r>
-              <a:rPr sz="1800">
-                <a:latin typeface="Courier"/>
-              </a:rPr>
-              <a:t>  )) </a:t>
-            </a:r>
-            <a:r>
-              <a:rPr sz="1800">
-                <a:solidFill>
-                  <a:srgbClr val="666666"/>
-                </a:solidFill>
-                <a:latin typeface="Courier"/>
-              </a:rPr>
-              <a:t>+</a:t>
-            </a:r>
-            <a:br/>
-            <a:r>
-              <a:rPr sz="1800">
-                <a:solidFill>
-                  <a:srgbClr val="4070A0"/>
-                </a:solidFill>
-                <a:latin typeface="Courier"/>
-              </a:rPr>
-              <a:t>  </a:t>
-            </a:r>
-            <a:r>
-              <a:rPr sz="1800" b="1">
-                <a:solidFill>
-                  <a:srgbClr val="007020"/>
-                </a:solidFill>
-                <a:latin typeface="Courier"/>
-              </a:rPr>
-              <a:t>geom_boxplot</a:t>
-            </a:r>
-            <a:r>
-              <a:rPr sz="1800">
-                <a:latin typeface="Courier"/>
-              </a:rPr>
-              <a:t>()</a:t>
+              <a:rPr/>
+              <a:t>How many patients weigh more than 70kg?</a:t>
+            </a:r>
+          </a:p>
+          <a:p>
+            <a:pPr lvl="2"/>
+            <a:r>
+              <a:rPr/>
+              <a:t>Hint- look at the </a:t>
+            </a:r>
+            <a:r>
+              <a:rPr sz="1800">
+                <a:latin typeface="Courier"/>
+              </a:rPr>
+              <a:t>n()</a:t>
+            </a:r>
+            <a:r>
+              <a:rPr/>
+              <a:t> function.</a:t>
+            </a:r>
+          </a:p>
+          <a:p>
+            <a:pPr lvl="1">
+              <a:buAutoNum type="arabicPeriod"/>
+            </a:pPr>
+            <a:r>
+              <a:rPr/>
+              <a:t>Outcome of patients who were 60 years or older?</a:t>
+            </a:r>
+          </a:p>
+          <a:p>
+            <a:pPr lvl="2"/>
+            <a:r>
+              <a:rPr/>
+              <a:t>What is the mean length of stay of patients who are 60 years or older?</a:t>
+            </a:r>
+          </a:p>
+          <a:p>
+            <a:pPr lvl="2"/>
+            <a:r>
+              <a:rPr/>
+              <a:t>How many of these patients were discharged alive?</a:t>
+            </a:r>
+          </a:p>
+          <a:p>
+            <a:pPr lvl="2"/>
+            <a:r>
+              <a:rPr/>
+              <a:t>Hint - the variable </a:t>
+            </a:r>
+            <a:r>
+              <a:rPr sz="1800">
+                <a:latin typeface="Courier"/>
+              </a:rPr>
+              <a:t>vital_status</a:t>
+            </a:r>
+            <a:r>
+              <a:rPr/>
+              <a:t> indicates if the patient was alive or dead on discharge.</a:t>
             </a:r>
           </a:p>
         </p:txBody>
@@ -10252,23 +10471,55 @@
             </a:pPr>
             <a:r>
               <a:rPr/>
-              <a:t>7.</a:t>
-            </a:r>
-            <a:r>
-              <a:rPr/>
-              <a:t> </a:t>
-            </a:r>
-            <a:r>
-              <a:rPr/>
-              <a:t>Deleting</a:t>
-            </a:r>
-            <a:r>
-              <a:rPr/>
-              <a:t> </a:t>
-            </a:r>
-            <a:r>
-              <a:rPr/>
-              <a:t>columns</a:t>
+              <a:t>How</a:t>
+            </a:r>
+            <a:r>
+              <a:rPr/>
+              <a:t> </a:t>
+            </a:r>
+            <a:r>
+              <a:rPr/>
+              <a:t>many</a:t>
+            </a:r>
+            <a:r>
+              <a:rPr/>
+              <a:t> </a:t>
+            </a:r>
+            <a:r>
+              <a:rPr/>
+              <a:t>patients</a:t>
+            </a:r>
+            <a:r>
+              <a:rPr/>
+              <a:t> </a:t>
+            </a:r>
+            <a:r>
+              <a:rPr/>
+              <a:t>weigh</a:t>
+            </a:r>
+            <a:r>
+              <a:rPr/>
+              <a:t> </a:t>
+            </a:r>
+            <a:r>
+              <a:rPr/>
+              <a:t>more</a:t>
+            </a:r>
+            <a:r>
+              <a:rPr/>
+              <a:t> </a:t>
+            </a:r>
+            <a:r>
+              <a:rPr/>
+              <a:t>than</a:t>
+            </a:r>
+            <a:r>
+              <a:rPr/>
+              <a:t> </a:t>
+            </a:r>
+            <a:r>
+              <a:rPr/>
+              <a:t>70kg?</a:t>
             </a:r>
           </a:p>
         </p:txBody>
@@ -10294,22 +10545,145 @@
           <a:bodyPr/>
           <a:lstStyle/>
           <a:p>
-            <a:pPr lvl="0" marL="0" indent="0">
+            <a:pPr lvl="0" marL="1270000" indent="0">
               <a:buNone/>
             </a:pPr>
             <a:r>
-              <a:rPr/>
-              <a:t>What if we wanted to remove the </a:t>
-            </a:r>
-            <a:r>
-              <a:rPr sz="1800">
-                <a:latin typeface="Courier"/>
-              </a:rPr>
-              <a:t>lactate</a:t>
-            </a:r>
-            <a:r>
-              <a:rPr/>
-              <a:t> variable?</a:t>
+              <a:rPr sz="1800">
+                <a:latin typeface="Courier"/>
+              </a:rPr>
+              <a:t>cchic </a:t>
+            </a:r>
+            <a:r>
+              <a:rPr sz="1800">
+                <a:solidFill>
+                  <a:srgbClr val="666666"/>
+                </a:solidFill>
+                <a:latin typeface="Courier"/>
+              </a:rPr>
+              <a:t>%&gt;%</a:t>
+            </a:r>
+            <a:br/>
+            <a:r>
+              <a:rPr sz="1800">
+                <a:solidFill>
+                  <a:srgbClr val="4070A0"/>
+                </a:solidFill>
+                <a:latin typeface="Courier"/>
+              </a:rPr>
+              <a:t>  </a:t>
+            </a:r>
+            <a:r>
+              <a:rPr sz="1800" b="1">
+                <a:solidFill>
+                  <a:srgbClr val="007020"/>
+                </a:solidFill>
+                <a:latin typeface="Courier"/>
+              </a:rPr>
+              <a:t>filter</a:t>
+            </a:r>
+            <a:r>
+              <a:rPr sz="1800">
+                <a:latin typeface="Courier"/>
+              </a:rPr>
+              <a:t>(weight </a:t>
+            </a:r>
+            <a:r>
+              <a:rPr sz="1800">
+                <a:solidFill>
+                  <a:srgbClr val="666666"/>
+                </a:solidFill>
+                <a:latin typeface="Courier"/>
+              </a:rPr>
+              <a:t>&gt;</a:t>
+            </a:r>
+            <a:r>
+              <a:rPr sz="1800">
+                <a:solidFill>
+                  <a:srgbClr val="4070A0"/>
+                </a:solidFill>
+                <a:latin typeface="Courier"/>
+              </a:rPr>
+              <a:t> </a:t>
+            </a:r>
+            <a:r>
+              <a:rPr sz="1800">
+                <a:solidFill>
+                  <a:srgbClr val="40A070"/>
+                </a:solidFill>
+                <a:latin typeface="Courier"/>
+              </a:rPr>
+              <a:t>70</a:t>
+            </a:r>
+            <a:r>
+              <a:rPr sz="1800">
+                <a:latin typeface="Courier"/>
+              </a:rPr>
+              <a:t>) </a:t>
+            </a:r>
+            <a:r>
+              <a:rPr sz="1800">
+                <a:solidFill>
+                  <a:srgbClr val="666666"/>
+                </a:solidFill>
+                <a:latin typeface="Courier"/>
+              </a:rPr>
+              <a:t>%&gt;%</a:t>
+            </a:r>
+            <a:br/>
+            <a:r>
+              <a:rPr sz="1800">
+                <a:solidFill>
+                  <a:srgbClr val="4070A0"/>
+                </a:solidFill>
+                <a:latin typeface="Courier"/>
+              </a:rPr>
+              <a:t>  </a:t>
+            </a:r>
+            <a:r>
+              <a:rPr sz="1800" b="1">
+                <a:solidFill>
+                  <a:srgbClr val="007020"/>
+                </a:solidFill>
+                <a:latin typeface="Courier"/>
+              </a:rPr>
+              <a:t>summarise</a:t>
+            </a:r>
+            <a:r>
+              <a:rPr sz="1800">
+                <a:latin typeface="Courier"/>
+              </a:rPr>
+              <a:t>(</a:t>
+            </a:r>
+            <a:r>
+              <a:rPr sz="1800">
+                <a:solidFill>
+                  <a:srgbClr val="902000"/>
+                </a:solidFill>
+                <a:latin typeface="Courier"/>
+              </a:rPr>
+              <a:t>number =</a:t>
+            </a:r>
+            <a:r>
+              <a:rPr sz="1800">
+                <a:latin typeface="Courier"/>
+              </a:rPr>
+              <a:t> </a:t>
+            </a:r>
+            <a:r>
+              <a:rPr sz="1800" b="1">
+                <a:solidFill>
+                  <a:srgbClr val="007020"/>
+                </a:solidFill>
+                <a:latin typeface="Courier"/>
+              </a:rPr>
+              <a:t>n</a:t>
+            </a:r>
+            <a:r>
+              <a:rPr sz="1800">
+                <a:latin typeface="Courier"/>
+              </a:rPr>
+              <a:t>())</a:t>
             </a:r>
           </a:p>
           <a:p>
@@ -10320,84 +10694,10 @@
               <a:rPr sz="1800">
                 <a:latin typeface="Courier"/>
               </a:rPr>
-              <a:t>cchic </a:t>
-            </a:r>
-            <a:r>
-              <a:rPr sz="1800">
-                <a:solidFill>
-                  <a:srgbClr val="666666"/>
-                </a:solidFill>
-                <a:latin typeface="Courier"/>
-              </a:rPr>
-              <a:t>%&gt;%</a:t>
-            </a:r>
-            <a:br/>
-            <a:r>
-              <a:rPr sz="1800">
-                <a:solidFill>
-                  <a:srgbClr val="4070A0"/>
-                </a:solidFill>
-                <a:latin typeface="Courier"/>
-              </a:rPr>
-              <a:t>  </a:t>
-            </a:r>
-            <a:r>
-              <a:rPr sz="1800" b="1">
-                <a:solidFill>
-                  <a:srgbClr val="007020"/>
-                </a:solidFill>
-                <a:latin typeface="Courier"/>
-              </a:rPr>
-              <a:t>select</a:t>
-            </a:r>
-            <a:r>
-              <a:rPr sz="1800">
-                <a:latin typeface="Courier"/>
-              </a:rPr>
-              <a:t>(</a:t>
-            </a:r>
-            <a:r>
-              <a:rPr sz="1800">
-                <a:solidFill>
-                  <a:srgbClr val="666666"/>
-                </a:solidFill>
-                <a:latin typeface="Courier"/>
-              </a:rPr>
-              <a:t>-</a:t>
-            </a:r>
-            <a:r>
-              <a:rPr sz="1800">
-                <a:latin typeface="Courier"/>
-              </a:rPr>
-              <a:t>lactate)</a:t>
-            </a:r>
-          </a:p>
-          <a:p>
-            <a:pPr lvl="0" marL="0" indent="0">
-              <a:buNone/>
-            </a:pPr>
-            <a:r>
-              <a:rPr/>
-              <a:t>The </a:t>
-            </a:r>
-            <a:r>
-              <a:rPr sz="1800">
-                <a:latin typeface="Courier"/>
-              </a:rPr>
-              <a:t>-</a:t>
-            </a:r>
-            <a:r>
-              <a:rPr/>
-              <a:t> sign means deselect here.</a:t>
-            </a:r>
-          </a:p>
-          <a:p>
-            <a:pPr lvl="0" marL="0" indent="0">
-              <a:buNone/>
-            </a:pPr>
-            <a:r>
-              <a:rPr/>
-              <a:t>Don’t forget to assign the above code to something, otherwise the output won’t be saved.</a:t>
+              <a:t>## # A tibble: 1 x 1
+##   number
+##    &lt;int&gt;
+## 1    526</a:t>
             </a:r>
           </a:p>
         </p:txBody>
@@ -10408,426 +10708,6 @@
 </file>
 
 <file path=ppt/slides/slide35.xml><?xml version="1.0" encoding="utf-8"?>
-<p:sld xmlns:a="http://schemas.openxmlformats.org/drawingml/2006/main" xmlns:r="http://schemas.openxmlformats.org/officeDocument/2006/relationships" xmlns:p="http://schemas.openxmlformats.org/presentationml/2006/main">
-  <p:cSld>
-    <p:spTree>
-      <p:nvGrpSpPr>
-        <p:cNvPr id="1" name=""/>
-        <p:cNvGrpSpPr/>
-        <p:nvPr/>
-      </p:nvGrpSpPr>
-      <p:grpSpPr>
-        <a:xfrm>
-          <a:off x="0" y="0"/>
-          <a:ext cx="0" cy="0"/>
-          <a:chOff x="0" y="0"/>
-          <a:chExt cx="0" cy="0"/>
-        </a:xfrm>
-      </p:grpSpPr>
-      <p:sp>
-        <p:nvSpPr>
-          <p:cNvPr id="2" name="Title 1">
-            <a:extLst>
-              <a:ext uri="{FF2B5EF4-FFF2-40B4-BE49-F238E27FC236}">
-                <a16:creationId xmlns:a16="http://schemas.microsoft.com/office/drawing/2014/main" id="{5567D468-EE70-CD4E-A3AC-039CC11EF1FB}"/>
-              </a:ext>
-            </a:extLst>
-          </p:cNvPr>
-          <p:cNvSpPr>
-            <a:spLocks noGrp="1"/>
-          </p:cNvSpPr>
-          <p:nvPr>
-            <p:ph type="title"/>
-          </p:nvPr>
-        </p:nvSpPr>
-        <p:spPr/>
-        <p:txBody>
-          <a:bodyPr/>
-          <a:lstStyle/>
-          <a:p>
-            <a:pPr lvl="0" marL="0" indent="0">
-              <a:buNone/>
-            </a:pPr>
-            <a:r>
-              <a:rPr/>
-              <a:t>Excercise</a:t>
-            </a:r>
-          </a:p>
-        </p:txBody>
-      </p:sp>
-      <p:sp>
-        <p:nvSpPr>
-          <p:cNvPr id="3" name="Content Placeholder 2">
-            <a:extLst>
-              <a:ext uri="{FF2B5EF4-FFF2-40B4-BE49-F238E27FC236}">
-                <a16:creationId xmlns:a16="http://schemas.microsoft.com/office/drawing/2014/main" id="{D10DDA37-E46B-B641-BC9F-636CB92A2C08}"/>
-              </a:ext>
-            </a:extLst>
-          </p:cNvPr>
-          <p:cNvSpPr>
-            <a:spLocks noGrp="1"/>
-          </p:cNvSpPr>
-          <p:nvPr>
-            <p:ph idx="1"/>
-          </p:nvPr>
-        </p:nvSpPr>
-        <p:spPr/>
-        <p:txBody>
-          <a:bodyPr/>
-          <a:lstStyle/>
-          <a:p>
-            <a:pPr lvl="1">
-              <a:buAutoNum type="arabicPeriod"/>
-            </a:pPr>
-            <a:r>
-              <a:rPr/>
-              <a:t>How many patients weigh more than 70kg?</a:t>
-            </a:r>
-          </a:p>
-          <a:p>
-            <a:pPr lvl="2"/>
-            <a:r>
-              <a:rPr/>
-              <a:t>Hint- look at the </a:t>
-            </a:r>
-            <a:r>
-              <a:rPr sz="1800">
-                <a:latin typeface="Courier"/>
-              </a:rPr>
-              <a:t>n()</a:t>
-            </a:r>
-            <a:r>
-              <a:rPr/>
-              <a:t> function.</a:t>
-            </a:r>
-          </a:p>
-          <a:p>
-            <a:pPr lvl="1">
-              <a:buAutoNum type="arabicPeriod"/>
-            </a:pPr>
-            <a:r>
-              <a:rPr/>
-              <a:t>Outcome of patients who were 60 years or older?</a:t>
-            </a:r>
-          </a:p>
-          <a:p>
-            <a:pPr lvl="2"/>
-            <a:r>
-              <a:rPr/>
-              <a:t>What is the mean length of stay of patients who are 60 years or older?</a:t>
-            </a:r>
-          </a:p>
-          <a:p>
-            <a:pPr lvl="2"/>
-            <a:r>
-              <a:rPr/>
-              <a:t>How many of these patients were discharged alive?</a:t>
-            </a:r>
-          </a:p>
-          <a:p>
-            <a:pPr lvl="2"/>
-            <a:r>
-              <a:rPr/>
-              <a:t>Hint - the variable </a:t>
-            </a:r>
-            <a:r>
-              <a:rPr sz="1800">
-                <a:latin typeface="Courier"/>
-              </a:rPr>
-              <a:t>vital_status</a:t>
-            </a:r>
-            <a:r>
-              <a:rPr/>
-              <a:t> indicates if the patient was alive or dead on discharge.</a:t>
-            </a:r>
-          </a:p>
-        </p:txBody>
-      </p:sp>
-    </p:spTree>
-  </p:cSld>
-</p:sld>
-</file>
-
-<file path=ppt/slides/slide36.xml><?xml version="1.0" encoding="utf-8"?>
-<p:sld xmlns:a="http://schemas.openxmlformats.org/drawingml/2006/main" xmlns:r="http://schemas.openxmlformats.org/officeDocument/2006/relationships" xmlns:p="http://schemas.openxmlformats.org/presentationml/2006/main">
-  <p:cSld>
-    <p:spTree>
-      <p:nvGrpSpPr>
-        <p:cNvPr id="1" name=""/>
-        <p:cNvGrpSpPr/>
-        <p:nvPr/>
-      </p:nvGrpSpPr>
-      <p:grpSpPr>
-        <a:xfrm>
-          <a:off x="0" y="0"/>
-          <a:ext cx="0" cy="0"/>
-          <a:chOff x="0" y="0"/>
-          <a:chExt cx="0" cy="0"/>
-        </a:xfrm>
-      </p:grpSpPr>
-      <p:sp>
-        <p:nvSpPr>
-          <p:cNvPr id="2" name="Title 1">
-            <a:extLst>
-              <a:ext uri="{FF2B5EF4-FFF2-40B4-BE49-F238E27FC236}">
-                <a16:creationId xmlns:a16="http://schemas.microsoft.com/office/drawing/2014/main" id="{5567D468-EE70-CD4E-A3AC-039CC11EF1FB}"/>
-              </a:ext>
-            </a:extLst>
-          </p:cNvPr>
-          <p:cNvSpPr>
-            <a:spLocks noGrp="1"/>
-          </p:cNvSpPr>
-          <p:nvPr>
-            <p:ph type="title"/>
-          </p:nvPr>
-        </p:nvSpPr>
-        <p:spPr/>
-        <p:txBody>
-          <a:bodyPr/>
-          <a:lstStyle/>
-          <a:p>
-            <a:pPr lvl="0" marL="0" indent="0">
-              <a:buNone/>
-            </a:pPr>
-            <a:r>
-              <a:rPr/>
-              <a:t>How</a:t>
-            </a:r>
-            <a:r>
-              <a:rPr/>
-              <a:t> </a:t>
-            </a:r>
-            <a:r>
-              <a:rPr/>
-              <a:t>many</a:t>
-            </a:r>
-            <a:r>
-              <a:rPr/>
-              <a:t> </a:t>
-            </a:r>
-            <a:r>
-              <a:rPr/>
-              <a:t>patients</a:t>
-            </a:r>
-            <a:r>
-              <a:rPr/>
-              <a:t> </a:t>
-            </a:r>
-            <a:r>
-              <a:rPr/>
-              <a:t>weigh</a:t>
-            </a:r>
-            <a:r>
-              <a:rPr/>
-              <a:t> </a:t>
-            </a:r>
-            <a:r>
-              <a:rPr/>
-              <a:t>more</a:t>
-            </a:r>
-            <a:r>
-              <a:rPr/>
-              <a:t> </a:t>
-            </a:r>
-            <a:r>
-              <a:rPr/>
-              <a:t>than</a:t>
-            </a:r>
-            <a:r>
-              <a:rPr/>
-              <a:t> </a:t>
-            </a:r>
-            <a:r>
-              <a:rPr/>
-              <a:t>70kg?</a:t>
-            </a:r>
-          </a:p>
-        </p:txBody>
-      </p:sp>
-      <p:sp>
-        <p:nvSpPr>
-          <p:cNvPr id="3" name="Content Placeholder 2">
-            <a:extLst>
-              <a:ext uri="{FF2B5EF4-FFF2-40B4-BE49-F238E27FC236}">
-                <a16:creationId xmlns:a16="http://schemas.microsoft.com/office/drawing/2014/main" id="{D10DDA37-E46B-B641-BC9F-636CB92A2C08}"/>
-              </a:ext>
-            </a:extLst>
-          </p:cNvPr>
-          <p:cNvSpPr>
-            <a:spLocks noGrp="1"/>
-          </p:cNvSpPr>
-          <p:nvPr>
-            <p:ph idx="1"/>
-          </p:nvPr>
-        </p:nvSpPr>
-        <p:spPr/>
-        <p:txBody>
-          <a:bodyPr/>
-          <a:lstStyle/>
-          <a:p>
-            <a:pPr lvl="0" marL="1270000" indent="0">
-              <a:buNone/>
-            </a:pPr>
-            <a:r>
-              <a:rPr sz="1800">
-                <a:latin typeface="Courier"/>
-              </a:rPr>
-              <a:t>cchic </a:t>
-            </a:r>
-            <a:r>
-              <a:rPr sz="1800">
-                <a:solidFill>
-                  <a:srgbClr val="666666"/>
-                </a:solidFill>
-                <a:latin typeface="Courier"/>
-              </a:rPr>
-              <a:t>%&gt;%</a:t>
-            </a:r>
-            <a:br/>
-            <a:r>
-              <a:rPr sz="1800">
-                <a:solidFill>
-                  <a:srgbClr val="4070A0"/>
-                </a:solidFill>
-                <a:latin typeface="Courier"/>
-              </a:rPr>
-              <a:t>  </a:t>
-            </a:r>
-            <a:r>
-              <a:rPr sz="1800" b="1">
-                <a:solidFill>
-                  <a:srgbClr val="007020"/>
-                </a:solidFill>
-                <a:latin typeface="Courier"/>
-              </a:rPr>
-              <a:t>filter</a:t>
-            </a:r>
-            <a:r>
-              <a:rPr sz="1800">
-                <a:latin typeface="Courier"/>
-              </a:rPr>
-              <a:t>(weight </a:t>
-            </a:r>
-            <a:r>
-              <a:rPr sz="1800">
-                <a:solidFill>
-                  <a:srgbClr val="666666"/>
-                </a:solidFill>
-                <a:latin typeface="Courier"/>
-              </a:rPr>
-              <a:t>&gt;</a:t>
-            </a:r>
-            <a:r>
-              <a:rPr sz="1800">
-                <a:solidFill>
-                  <a:srgbClr val="4070A0"/>
-                </a:solidFill>
-                <a:latin typeface="Courier"/>
-              </a:rPr>
-              <a:t> </a:t>
-            </a:r>
-            <a:r>
-              <a:rPr sz="1800">
-                <a:solidFill>
-                  <a:srgbClr val="40A070"/>
-                </a:solidFill>
-                <a:latin typeface="Courier"/>
-              </a:rPr>
-              <a:t>70</a:t>
-            </a:r>
-            <a:r>
-              <a:rPr sz="1800">
-                <a:latin typeface="Courier"/>
-              </a:rPr>
-              <a:t>) </a:t>
-            </a:r>
-            <a:r>
-              <a:rPr sz="1800">
-                <a:solidFill>
-                  <a:srgbClr val="666666"/>
-                </a:solidFill>
-                <a:latin typeface="Courier"/>
-              </a:rPr>
-              <a:t>%&gt;%</a:t>
-            </a:r>
-            <a:br/>
-            <a:r>
-              <a:rPr sz="1800">
-                <a:solidFill>
-                  <a:srgbClr val="4070A0"/>
-                </a:solidFill>
-                <a:latin typeface="Courier"/>
-              </a:rPr>
-              <a:t>  </a:t>
-            </a:r>
-            <a:r>
-              <a:rPr sz="1800" b="1">
-                <a:solidFill>
-                  <a:srgbClr val="007020"/>
-                </a:solidFill>
-                <a:latin typeface="Courier"/>
-              </a:rPr>
-              <a:t>summarise</a:t>
-            </a:r>
-            <a:r>
-              <a:rPr sz="1800">
-                <a:latin typeface="Courier"/>
-              </a:rPr>
-              <a:t>(</a:t>
-            </a:r>
-            <a:r>
-              <a:rPr sz="1800">
-                <a:solidFill>
-                  <a:srgbClr val="902000"/>
-                </a:solidFill>
-                <a:latin typeface="Courier"/>
-              </a:rPr>
-              <a:t>number =</a:t>
-            </a:r>
-            <a:r>
-              <a:rPr sz="1800">
-                <a:latin typeface="Courier"/>
-              </a:rPr>
-              <a:t> </a:t>
-            </a:r>
-            <a:r>
-              <a:rPr sz="1800" b="1">
-                <a:solidFill>
-                  <a:srgbClr val="007020"/>
-                </a:solidFill>
-                <a:latin typeface="Courier"/>
-              </a:rPr>
-              <a:t>n</a:t>
-            </a:r>
-            <a:r>
-              <a:rPr sz="1800">
-                <a:latin typeface="Courier"/>
-              </a:rPr>
-              <a:t>())</a:t>
-            </a:r>
-          </a:p>
-          <a:p>
-            <a:pPr lvl="0" marL="1270000" indent="0">
-              <a:buNone/>
-            </a:pPr>
-            <a:r>
-              <a:rPr sz="1800">
-                <a:latin typeface="Courier"/>
-              </a:rPr>
-              <a:t>## # A tibble: 1 x 1
-##   number
-##    &lt;int&gt;
-## 1    526</a:t>
-            </a:r>
-          </a:p>
-        </p:txBody>
-      </p:sp>
-    </p:spTree>
-  </p:cSld>
-</p:sld>
-</file>
-
-<file path=ppt/slides/slide37.xml><?xml version="1.0" encoding="utf-8"?>
 <p:sld xmlns:a="http://schemas.openxmlformats.org/drawingml/2006/main" xmlns:r="http://schemas.openxmlformats.org/officeDocument/2006/relationships" xmlns:p="http://schemas.openxmlformats.org/presentationml/2006/main">
   <p:cSld>
     <p:spTree>

</xml_diff>